<commit_message>
image preprocessing for autoencoder improvement
</commit_message>
<xml_diff>
--- a/data/autoencoder_tuning.pptx
+++ b/data/autoencoder_tuning.pptx
@@ -11,7 +11,10 @@
     <p:sldId id="259" r:id="rId5"/>
     <p:sldId id="260" r:id="rId6"/>
     <p:sldId id="262" r:id="rId7"/>
-    <p:sldId id="261" r:id="rId8"/>
+    <p:sldId id="263" r:id="rId8"/>
+    <p:sldId id="264" r:id="rId9"/>
+    <p:sldId id="265" r:id="rId10"/>
+    <p:sldId id="261" r:id="rId11"/>
   </p:sldIdLst>
   <p:sldSz cx="12192000" cy="6858000"/>
   <p:notesSz cx="6858000" cy="9144000"/>
@@ -3396,6 +3399,101 @@
 </p:sld>
 </file>
 
+<file path=ppt/slides/slide10.xml><?xml version="1.0" encoding="utf-8"?>
+<p:sld xmlns:a="http://schemas.openxmlformats.org/drawingml/2006/main" xmlns:r="http://schemas.openxmlformats.org/officeDocument/2006/relationships" xmlns:p="http://schemas.openxmlformats.org/presentationml/2006/main">
+  <p:cSld>
+    <p:spTree>
+      <p:nvGrpSpPr>
+        <p:cNvPr id="1" name=""/>
+        <p:cNvGrpSpPr/>
+        <p:nvPr/>
+      </p:nvGrpSpPr>
+      <p:grpSpPr>
+        <a:xfrm>
+          <a:off x="0" y="0"/>
+          <a:ext cx="0" cy="0"/>
+          <a:chOff x="0" y="0"/>
+          <a:chExt cx="0" cy="0"/>
+        </a:xfrm>
+      </p:grpSpPr>
+      <p:sp>
+        <p:nvSpPr>
+          <p:cNvPr id="2" name="Title 1">
+            <a:extLst>
+              <a:ext uri="{FF2B5EF4-FFF2-40B4-BE49-F238E27FC236}">
+                <a16:creationId xmlns:a16="http://schemas.microsoft.com/office/drawing/2014/main" id="{695F0D4A-8296-A047-9CD6-1141E760CE81}"/>
+              </a:ext>
+            </a:extLst>
+          </p:cNvPr>
+          <p:cNvSpPr>
+            <a:spLocks noGrp="1"/>
+          </p:cNvSpPr>
+          <p:nvPr>
+            <p:ph type="title"/>
+          </p:nvPr>
+        </p:nvSpPr>
+        <p:spPr/>
+        <p:txBody>
+          <a:bodyPr/>
+          <a:lstStyle/>
+          <a:p>
+            <a:r>
+              <a:rPr lang="en-GB" dirty="0"/>
+              <a:t>Observations</a:t>
+            </a:r>
+          </a:p>
+        </p:txBody>
+      </p:sp>
+      <p:sp>
+        <p:nvSpPr>
+          <p:cNvPr id="3" name="Content Placeholder 2">
+            <a:extLst>
+              <a:ext uri="{FF2B5EF4-FFF2-40B4-BE49-F238E27FC236}">
+                <a16:creationId xmlns:a16="http://schemas.microsoft.com/office/drawing/2014/main" id="{B0E0D38F-3D2F-6B42-BFC7-780B2D6EF56C}"/>
+              </a:ext>
+            </a:extLst>
+          </p:cNvPr>
+          <p:cNvSpPr>
+            <a:spLocks noGrp="1"/>
+          </p:cNvSpPr>
+          <p:nvPr>
+            <p:ph idx="1"/>
+          </p:nvPr>
+        </p:nvSpPr>
+        <p:spPr/>
+        <p:txBody>
+          <a:bodyPr/>
+          <a:lstStyle/>
+          <a:p>
+            <a:r>
+              <a:rPr lang="en-GB" dirty="0"/>
+              <a:t>Loss tends to not go lower than 0.0315</a:t>
+            </a:r>
+          </a:p>
+          <a:p>
+            <a:r>
+              <a:rPr lang="en-GB" dirty="0"/>
+              <a:t>Activation stabilises loss</a:t>
+            </a:r>
+          </a:p>
+          <a:p>
+            <a:endParaRPr lang="en-GB" dirty="0"/>
+          </a:p>
+        </p:txBody>
+      </p:sp>
+    </p:spTree>
+    <p:extLst>
+      <p:ext uri="{BB962C8B-B14F-4D97-AF65-F5344CB8AC3E}">
+        <p14:creationId xmlns:p14="http://schemas.microsoft.com/office/powerpoint/2010/main" val="1476830990"/>
+      </p:ext>
+    </p:extLst>
+  </p:cSld>
+  <p:clrMapOvr>
+    <a:masterClrMapping/>
+  </p:clrMapOvr>
+</p:sld>
+</file>
+
 <file path=ppt/slides/slide2.xml><?xml version="1.0" encoding="utf-8"?>
 <p:sld xmlns:a="http://schemas.openxmlformats.org/drawingml/2006/main" xmlns:r="http://schemas.openxmlformats.org/officeDocument/2006/relationships" xmlns:p="http://schemas.openxmlformats.org/presentationml/2006/main">
   <p:cSld>
@@ -4398,6 +4496,41 @@
                 <a:latin typeface="Courier New" panose="02070309020205020404" pitchFamily="49" charset="0"/>
               </a:rPr>
               <a:t>)(x)</a:t>
+            </a:r>
+          </a:p>
+        </p:txBody>
+      </p:sp>
+      <p:sp>
+        <p:nvSpPr>
+          <p:cNvPr id="7" name="TextBox 6">
+            <a:extLst>
+              <a:ext uri="{FF2B5EF4-FFF2-40B4-BE49-F238E27FC236}">
+                <a16:creationId xmlns:a16="http://schemas.microsoft.com/office/drawing/2014/main" id="{8375C546-CACC-9E4B-9227-47500DE80685}"/>
+              </a:ext>
+            </a:extLst>
+          </p:cNvPr>
+          <p:cNvSpPr txBox="1"/>
+          <p:nvPr/>
+        </p:nvSpPr>
+        <p:spPr>
+          <a:xfrm>
+            <a:off x="3076832" y="3978876"/>
+            <a:ext cx="5202195" cy="369332"/>
+          </a:xfrm>
+          <a:prstGeom prst="rect">
+            <a:avLst/>
+          </a:prstGeom>
+          <a:noFill/>
+        </p:spPr>
+        <p:txBody>
+          <a:bodyPr wrap="square" rtlCol="0">
+            <a:spAutoFit/>
+          </a:bodyPr>
+          <a:lstStyle/>
+          <a:p>
+            <a:r>
+              <a:rPr lang="en-GB" dirty="0"/>
+              <a:t>* No reduction of dimensionality.</a:t>
             </a:r>
           </a:p>
         </p:txBody>
@@ -8855,10 +8988,1109 @@
       </p:grpSpPr>
       <p:sp>
         <p:nvSpPr>
+          <p:cNvPr id="3" name="Content Placeholder 2">
+            <a:extLst>
+              <a:ext uri="{FF2B5EF4-FFF2-40B4-BE49-F238E27FC236}">
+                <a16:creationId xmlns:a16="http://schemas.microsoft.com/office/drawing/2014/main" id="{F9D1A17B-D1EF-6546-A2F5-97B99A21B6A0}"/>
+              </a:ext>
+            </a:extLst>
+          </p:cNvPr>
+          <p:cNvSpPr>
+            <a:spLocks noGrp="1"/>
+          </p:cNvSpPr>
+          <p:nvPr>
+            <p:ph idx="1"/>
+          </p:nvPr>
+        </p:nvSpPr>
+        <p:spPr>
+          <a:xfrm>
+            <a:off x="4087906" y="431800"/>
+            <a:ext cx="7265894" cy="5745163"/>
+          </a:xfrm>
+        </p:spPr>
+        <p:txBody>
+          <a:bodyPr/>
+          <a:lstStyle/>
+          <a:p>
+            <a:r>
+              <a:rPr lang="en-GB" dirty="0"/>
+              <a:t>Dimensionality well reduced but big loss of information</a:t>
+            </a:r>
+          </a:p>
+          <a:p>
+            <a:endParaRPr lang="en-GB" dirty="0"/>
+          </a:p>
+        </p:txBody>
+      </p:sp>
+      <p:pic>
+        <p:nvPicPr>
+          <p:cNvPr id="4" name="Picture 3">
+            <a:extLst>
+              <a:ext uri="{FF2B5EF4-FFF2-40B4-BE49-F238E27FC236}">
+                <a16:creationId xmlns:a16="http://schemas.microsoft.com/office/drawing/2014/main" id="{ED256095-DAB3-A247-856D-914036EE1DD1}"/>
+              </a:ext>
+            </a:extLst>
+          </p:cNvPr>
+          <p:cNvPicPr>
+            <a:picLocks noChangeAspect="1"/>
+          </p:cNvPicPr>
+          <p:nvPr/>
+        </p:nvPicPr>
+        <p:blipFill>
+          <a:blip r:embed="rId2"/>
+          <a:stretch>
+            <a:fillRect/>
+          </a:stretch>
+        </p:blipFill>
+        <p:spPr>
+          <a:xfrm>
+            <a:off x="645459" y="0"/>
+            <a:ext cx="3213100" cy="6426200"/>
+          </a:xfrm>
+          <a:prstGeom prst="rect">
+            <a:avLst/>
+          </a:prstGeom>
+        </p:spPr>
+      </p:pic>
+      <p:sp>
+        <p:nvSpPr>
+          <p:cNvPr id="5" name="Rectangle 4">
+            <a:extLst>
+              <a:ext uri="{FF2B5EF4-FFF2-40B4-BE49-F238E27FC236}">
+                <a16:creationId xmlns:a16="http://schemas.microsoft.com/office/drawing/2014/main" id="{DCFD9DD2-47EE-E74D-8042-66A36756E3DA}"/>
+              </a:ext>
+            </a:extLst>
+          </p:cNvPr>
+          <p:cNvSpPr/>
+          <p:nvPr/>
+        </p:nvSpPr>
+        <p:spPr>
+          <a:xfrm>
+            <a:off x="4345459" y="2105437"/>
+            <a:ext cx="6096000" cy="3046988"/>
+          </a:xfrm>
+          <a:prstGeom prst="rect">
+            <a:avLst/>
+          </a:prstGeom>
+        </p:spPr>
+        <p:txBody>
+          <a:bodyPr>
+            <a:spAutoFit/>
+          </a:bodyPr>
+          <a:lstStyle/>
+          <a:p>
+            <a:r>
+              <a:rPr lang="en-GB" sz="1200" b="0" i="0" u="none" strike="noStrike" dirty="0">
+                <a:solidFill>
+                  <a:srgbClr val="008000"/>
+                </a:solidFill>
+                <a:effectLst/>
+                <a:latin typeface="Courier New" panose="02070309020205020404" pitchFamily="49" charset="0"/>
+              </a:rPr>
+              <a:t># MODEL WORKING BEST</a:t>
+            </a:r>
+            <a:endParaRPr lang="en-GB" sz="1200" b="0" i="0" u="none" strike="noStrike" dirty="0">
+              <a:solidFill>
+                <a:srgbClr val="000000"/>
+              </a:solidFill>
+              <a:effectLst/>
+              <a:latin typeface="Courier New" panose="02070309020205020404" pitchFamily="49" charset="0"/>
+            </a:endParaRPr>
+          </a:p>
+          <a:p>
+            <a:r>
+              <a:rPr lang="en-GB" sz="1200" b="0" i="0" u="none" strike="noStrike" dirty="0">
+                <a:solidFill>
+                  <a:srgbClr val="000000"/>
+                </a:solidFill>
+                <a:effectLst/>
+                <a:latin typeface="Courier New" panose="02070309020205020404" pitchFamily="49" charset="0"/>
+              </a:rPr>
+              <a:t>x =  Conv2D(</a:t>
+            </a:r>
+            <a:r>
+              <a:rPr lang="en-GB" sz="1200" b="0" i="0" u="none" strike="noStrike" dirty="0">
+                <a:solidFill>
+                  <a:srgbClr val="09885A"/>
+                </a:solidFill>
+                <a:effectLst/>
+                <a:latin typeface="Courier New" panose="02070309020205020404" pitchFamily="49" charset="0"/>
+              </a:rPr>
+              <a:t>32</a:t>
+            </a:r>
+            <a:r>
+              <a:rPr lang="en-GB" sz="1200" b="0" i="0" u="none" strike="noStrike" dirty="0">
+                <a:solidFill>
+                  <a:srgbClr val="000000"/>
+                </a:solidFill>
+                <a:effectLst/>
+                <a:latin typeface="Courier New" panose="02070309020205020404" pitchFamily="49" charset="0"/>
+              </a:rPr>
+              <a:t>, (</a:t>
+            </a:r>
+            <a:r>
+              <a:rPr lang="en-GB" sz="1200" b="0" i="0" u="none" strike="noStrike" dirty="0">
+                <a:solidFill>
+                  <a:srgbClr val="09885A"/>
+                </a:solidFill>
+                <a:effectLst/>
+                <a:latin typeface="Courier New" panose="02070309020205020404" pitchFamily="49" charset="0"/>
+              </a:rPr>
+              <a:t>3</a:t>
+            </a:r>
+            <a:r>
+              <a:rPr lang="en-GB" sz="1200" b="0" i="0" u="none" strike="noStrike" dirty="0">
+                <a:solidFill>
+                  <a:srgbClr val="000000"/>
+                </a:solidFill>
+                <a:effectLst/>
+                <a:latin typeface="Courier New" panose="02070309020205020404" pitchFamily="49" charset="0"/>
+              </a:rPr>
+              <a:t>, </a:t>
+            </a:r>
+            <a:r>
+              <a:rPr lang="en-GB" sz="1200" b="0" i="0" u="none" strike="noStrike" dirty="0">
+                <a:solidFill>
+                  <a:srgbClr val="09885A"/>
+                </a:solidFill>
+                <a:effectLst/>
+                <a:latin typeface="Courier New" panose="02070309020205020404" pitchFamily="49" charset="0"/>
+              </a:rPr>
+              <a:t>3</a:t>
+            </a:r>
+            <a:r>
+              <a:rPr lang="en-GB" sz="1200" b="0" i="0" u="none" strike="noStrike" dirty="0">
+                <a:solidFill>
+                  <a:srgbClr val="000000"/>
+                </a:solidFill>
+                <a:effectLst/>
+                <a:latin typeface="Courier New" panose="02070309020205020404" pitchFamily="49" charset="0"/>
+              </a:rPr>
+              <a:t>), activation=</a:t>
+            </a:r>
+            <a:r>
+              <a:rPr lang="en-GB" sz="1200" b="0" i="0" u="none" strike="noStrike" dirty="0">
+                <a:solidFill>
+                  <a:srgbClr val="A31515"/>
+                </a:solidFill>
+                <a:effectLst/>
+                <a:latin typeface="Courier New" panose="02070309020205020404" pitchFamily="49" charset="0"/>
+              </a:rPr>
+              <a:t>'</a:t>
+            </a:r>
+            <a:r>
+              <a:rPr lang="en-GB" sz="1200" b="0" i="0" u="none" strike="noStrike" dirty="0" err="1">
+                <a:solidFill>
+                  <a:srgbClr val="A31515"/>
+                </a:solidFill>
+                <a:effectLst/>
+                <a:latin typeface="Courier New" panose="02070309020205020404" pitchFamily="49" charset="0"/>
+              </a:rPr>
+              <a:t>relu</a:t>
+            </a:r>
+            <a:r>
+              <a:rPr lang="en-GB" sz="1200" b="0" i="0" u="none" strike="noStrike" dirty="0">
+                <a:solidFill>
+                  <a:srgbClr val="A31515"/>
+                </a:solidFill>
+                <a:effectLst/>
+                <a:latin typeface="Courier New" panose="02070309020205020404" pitchFamily="49" charset="0"/>
+              </a:rPr>
+              <a:t>'</a:t>
+            </a:r>
+            <a:r>
+              <a:rPr lang="en-GB" sz="1200" b="0" i="0" u="none" strike="noStrike" dirty="0">
+                <a:solidFill>
+                  <a:srgbClr val="000000"/>
+                </a:solidFill>
+                <a:effectLst/>
+                <a:latin typeface="Courier New" panose="02070309020205020404" pitchFamily="49" charset="0"/>
+              </a:rPr>
+              <a:t>, padding=</a:t>
+            </a:r>
+            <a:r>
+              <a:rPr lang="en-GB" sz="1200" b="0" i="0" u="none" strike="noStrike" dirty="0">
+                <a:solidFill>
+                  <a:srgbClr val="A31515"/>
+                </a:solidFill>
+                <a:effectLst/>
+                <a:latin typeface="Courier New" panose="02070309020205020404" pitchFamily="49" charset="0"/>
+              </a:rPr>
+              <a:t>'same'</a:t>
+            </a:r>
+            <a:r>
+              <a:rPr lang="en-GB" sz="1200" b="0" i="0" u="none" strike="noStrike" dirty="0">
+                <a:solidFill>
+                  <a:srgbClr val="000000"/>
+                </a:solidFill>
+                <a:effectLst/>
+                <a:latin typeface="Courier New" panose="02070309020205020404" pitchFamily="49" charset="0"/>
+              </a:rPr>
+              <a:t>)(</a:t>
+            </a:r>
+            <a:r>
+              <a:rPr lang="en-GB" sz="1200" b="0" i="0" u="none" strike="noStrike" dirty="0" err="1">
+                <a:solidFill>
+                  <a:srgbClr val="000000"/>
+                </a:solidFill>
+                <a:effectLst/>
+                <a:latin typeface="Courier New" panose="02070309020205020404" pitchFamily="49" charset="0"/>
+              </a:rPr>
+              <a:t>input_img</a:t>
+            </a:r>
+            <a:r>
+              <a:rPr lang="en-GB" sz="1200" b="0" i="0" u="none" strike="noStrike" dirty="0">
+                <a:solidFill>
+                  <a:srgbClr val="000000"/>
+                </a:solidFill>
+                <a:effectLst/>
+                <a:latin typeface="Courier New" panose="02070309020205020404" pitchFamily="49" charset="0"/>
+              </a:rPr>
+              <a:t>)</a:t>
+            </a:r>
+          </a:p>
+          <a:p>
+            <a:r>
+              <a:rPr lang="en-GB" sz="1200" b="0" i="0" u="none" strike="noStrike" dirty="0">
+                <a:solidFill>
+                  <a:srgbClr val="000000"/>
+                </a:solidFill>
+                <a:effectLst/>
+                <a:latin typeface="Courier New" panose="02070309020205020404" pitchFamily="49" charset="0"/>
+              </a:rPr>
+              <a:t>x = MaxPooling2D((</a:t>
+            </a:r>
+            <a:r>
+              <a:rPr lang="en-GB" sz="1200" b="0" i="0" u="none" strike="noStrike" dirty="0">
+                <a:solidFill>
+                  <a:srgbClr val="09885A"/>
+                </a:solidFill>
+                <a:effectLst/>
+                <a:latin typeface="Courier New" panose="02070309020205020404" pitchFamily="49" charset="0"/>
+              </a:rPr>
+              <a:t>2</a:t>
+            </a:r>
+            <a:r>
+              <a:rPr lang="en-GB" sz="1200" b="0" i="0" u="none" strike="noStrike" dirty="0">
+                <a:solidFill>
+                  <a:srgbClr val="000000"/>
+                </a:solidFill>
+                <a:effectLst/>
+                <a:latin typeface="Courier New" panose="02070309020205020404" pitchFamily="49" charset="0"/>
+              </a:rPr>
+              <a:t>, </a:t>
+            </a:r>
+            <a:r>
+              <a:rPr lang="en-GB" sz="1200" b="0" i="0" u="none" strike="noStrike" dirty="0">
+                <a:solidFill>
+                  <a:srgbClr val="09885A"/>
+                </a:solidFill>
+                <a:effectLst/>
+                <a:latin typeface="Courier New" panose="02070309020205020404" pitchFamily="49" charset="0"/>
+              </a:rPr>
+              <a:t>2</a:t>
+            </a:r>
+            <a:r>
+              <a:rPr lang="en-GB" sz="1200" b="0" i="0" u="none" strike="noStrike" dirty="0">
+                <a:solidFill>
+                  <a:srgbClr val="000000"/>
+                </a:solidFill>
+                <a:effectLst/>
+                <a:latin typeface="Courier New" panose="02070309020205020404" pitchFamily="49" charset="0"/>
+              </a:rPr>
+              <a:t>), padding=</a:t>
+            </a:r>
+            <a:r>
+              <a:rPr lang="en-GB" sz="1200" b="0" i="0" u="none" strike="noStrike" dirty="0">
+                <a:solidFill>
+                  <a:srgbClr val="A31515"/>
+                </a:solidFill>
+                <a:effectLst/>
+                <a:latin typeface="Courier New" panose="02070309020205020404" pitchFamily="49" charset="0"/>
+              </a:rPr>
+              <a:t>'same'</a:t>
+            </a:r>
+            <a:r>
+              <a:rPr lang="en-GB" sz="1200" b="0" i="0" u="none" strike="noStrike" dirty="0">
+                <a:solidFill>
+                  <a:srgbClr val="000000"/>
+                </a:solidFill>
+                <a:effectLst/>
+                <a:latin typeface="Courier New" panose="02070309020205020404" pitchFamily="49" charset="0"/>
+              </a:rPr>
+              <a:t>)(x)</a:t>
+            </a:r>
+          </a:p>
+          <a:p>
+            <a:r>
+              <a:rPr lang="en-GB" sz="1200" b="0" i="0" u="none" strike="noStrike" dirty="0">
+                <a:solidFill>
+                  <a:srgbClr val="000000"/>
+                </a:solidFill>
+                <a:effectLst/>
+                <a:latin typeface="Courier New" panose="02070309020205020404" pitchFamily="49" charset="0"/>
+              </a:rPr>
+              <a:t>x = Conv2D(</a:t>
+            </a:r>
+            <a:r>
+              <a:rPr lang="en-GB" sz="1200" b="0" i="0" u="none" strike="noStrike" dirty="0">
+                <a:solidFill>
+                  <a:srgbClr val="09885A"/>
+                </a:solidFill>
+                <a:effectLst/>
+                <a:latin typeface="Courier New" panose="02070309020205020404" pitchFamily="49" charset="0"/>
+              </a:rPr>
+              <a:t>16</a:t>
+            </a:r>
+            <a:r>
+              <a:rPr lang="en-GB" sz="1200" b="0" i="0" u="none" strike="noStrike" dirty="0">
+                <a:solidFill>
+                  <a:srgbClr val="000000"/>
+                </a:solidFill>
+                <a:effectLst/>
+                <a:latin typeface="Courier New" panose="02070309020205020404" pitchFamily="49" charset="0"/>
+              </a:rPr>
+              <a:t>, (</a:t>
+            </a:r>
+            <a:r>
+              <a:rPr lang="en-GB" sz="1200" b="0" i="0" u="none" strike="noStrike" dirty="0">
+                <a:solidFill>
+                  <a:srgbClr val="09885A"/>
+                </a:solidFill>
+                <a:effectLst/>
+                <a:latin typeface="Courier New" panose="02070309020205020404" pitchFamily="49" charset="0"/>
+              </a:rPr>
+              <a:t>3</a:t>
+            </a:r>
+            <a:r>
+              <a:rPr lang="en-GB" sz="1200" b="0" i="0" u="none" strike="noStrike" dirty="0">
+                <a:solidFill>
+                  <a:srgbClr val="000000"/>
+                </a:solidFill>
+                <a:effectLst/>
+                <a:latin typeface="Courier New" panose="02070309020205020404" pitchFamily="49" charset="0"/>
+              </a:rPr>
+              <a:t>, </a:t>
+            </a:r>
+            <a:r>
+              <a:rPr lang="en-GB" sz="1200" b="0" i="0" u="none" strike="noStrike" dirty="0">
+                <a:solidFill>
+                  <a:srgbClr val="09885A"/>
+                </a:solidFill>
+                <a:effectLst/>
+                <a:latin typeface="Courier New" panose="02070309020205020404" pitchFamily="49" charset="0"/>
+              </a:rPr>
+              <a:t>3</a:t>
+            </a:r>
+            <a:r>
+              <a:rPr lang="en-GB" sz="1200" b="0" i="0" u="none" strike="noStrike" dirty="0">
+                <a:solidFill>
+                  <a:srgbClr val="000000"/>
+                </a:solidFill>
+                <a:effectLst/>
+                <a:latin typeface="Courier New" panose="02070309020205020404" pitchFamily="49" charset="0"/>
+              </a:rPr>
+              <a:t>), activation=</a:t>
+            </a:r>
+            <a:r>
+              <a:rPr lang="en-GB" sz="1200" b="0" i="0" u="none" strike="noStrike" dirty="0">
+                <a:solidFill>
+                  <a:srgbClr val="A31515"/>
+                </a:solidFill>
+                <a:effectLst/>
+                <a:latin typeface="Courier New" panose="02070309020205020404" pitchFamily="49" charset="0"/>
+              </a:rPr>
+              <a:t>'</a:t>
+            </a:r>
+            <a:r>
+              <a:rPr lang="en-GB" sz="1200" b="0" i="0" u="none" strike="noStrike" dirty="0" err="1">
+                <a:solidFill>
+                  <a:srgbClr val="A31515"/>
+                </a:solidFill>
+                <a:effectLst/>
+                <a:latin typeface="Courier New" panose="02070309020205020404" pitchFamily="49" charset="0"/>
+              </a:rPr>
+              <a:t>relu</a:t>
+            </a:r>
+            <a:r>
+              <a:rPr lang="en-GB" sz="1200" b="0" i="0" u="none" strike="noStrike" dirty="0">
+                <a:solidFill>
+                  <a:srgbClr val="A31515"/>
+                </a:solidFill>
+                <a:effectLst/>
+                <a:latin typeface="Courier New" panose="02070309020205020404" pitchFamily="49" charset="0"/>
+              </a:rPr>
+              <a:t>'</a:t>
+            </a:r>
+            <a:r>
+              <a:rPr lang="en-GB" sz="1200" b="0" i="0" u="none" strike="noStrike" dirty="0">
+                <a:solidFill>
+                  <a:srgbClr val="000000"/>
+                </a:solidFill>
+                <a:effectLst/>
+                <a:latin typeface="Courier New" panose="02070309020205020404" pitchFamily="49" charset="0"/>
+              </a:rPr>
+              <a:t>, padding=</a:t>
+            </a:r>
+            <a:r>
+              <a:rPr lang="en-GB" sz="1200" b="0" i="0" u="none" strike="noStrike" dirty="0">
+                <a:solidFill>
+                  <a:srgbClr val="A31515"/>
+                </a:solidFill>
+                <a:effectLst/>
+                <a:latin typeface="Courier New" panose="02070309020205020404" pitchFamily="49" charset="0"/>
+              </a:rPr>
+              <a:t>'same'</a:t>
+            </a:r>
+            <a:r>
+              <a:rPr lang="en-GB" sz="1200" b="0" i="0" u="none" strike="noStrike" dirty="0">
+                <a:solidFill>
+                  <a:srgbClr val="000000"/>
+                </a:solidFill>
+                <a:effectLst/>
+                <a:latin typeface="Courier New" panose="02070309020205020404" pitchFamily="49" charset="0"/>
+              </a:rPr>
+              <a:t>)(x)</a:t>
+            </a:r>
+          </a:p>
+          <a:p>
+            <a:r>
+              <a:rPr lang="en-GB" sz="1200" b="0" i="0" u="none" strike="noStrike" dirty="0">
+                <a:solidFill>
+                  <a:srgbClr val="000000"/>
+                </a:solidFill>
+                <a:effectLst/>
+                <a:latin typeface="Courier New" panose="02070309020205020404" pitchFamily="49" charset="0"/>
+              </a:rPr>
+              <a:t>x = MaxPooling2D((</a:t>
+            </a:r>
+            <a:r>
+              <a:rPr lang="en-GB" sz="1200" b="0" i="0" u="none" strike="noStrike" dirty="0">
+                <a:solidFill>
+                  <a:srgbClr val="09885A"/>
+                </a:solidFill>
+                <a:effectLst/>
+                <a:latin typeface="Courier New" panose="02070309020205020404" pitchFamily="49" charset="0"/>
+              </a:rPr>
+              <a:t>2</a:t>
+            </a:r>
+            <a:r>
+              <a:rPr lang="en-GB" sz="1200" b="0" i="0" u="none" strike="noStrike" dirty="0">
+                <a:solidFill>
+                  <a:srgbClr val="000000"/>
+                </a:solidFill>
+                <a:effectLst/>
+                <a:latin typeface="Courier New" panose="02070309020205020404" pitchFamily="49" charset="0"/>
+              </a:rPr>
+              <a:t>, </a:t>
+            </a:r>
+            <a:r>
+              <a:rPr lang="en-GB" sz="1200" b="0" i="0" u="none" strike="noStrike" dirty="0">
+                <a:solidFill>
+                  <a:srgbClr val="09885A"/>
+                </a:solidFill>
+                <a:effectLst/>
+                <a:latin typeface="Courier New" panose="02070309020205020404" pitchFamily="49" charset="0"/>
+              </a:rPr>
+              <a:t>2</a:t>
+            </a:r>
+            <a:r>
+              <a:rPr lang="en-GB" sz="1200" b="0" i="0" u="none" strike="noStrike" dirty="0">
+                <a:solidFill>
+                  <a:srgbClr val="000000"/>
+                </a:solidFill>
+                <a:effectLst/>
+                <a:latin typeface="Courier New" panose="02070309020205020404" pitchFamily="49" charset="0"/>
+              </a:rPr>
+              <a:t>), padding=</a:t>
+            </a:r>
+            <a:r>
+              <a:rPr lang="en-GB" sz="1200" b="0" i="0" u="none" strike="noStrike" dirty="0">
+                <a:solidFill>
+                  <a:srgbClr val="A31515"/>
+                </a:solidFill>
+                <a:effectLst/>
+                <a:latin typeface="Courier New" panose="02070309020205020404" pitchFamily="49" charset="0"/>
+              </a:rPr>
+              <a:t>'same'</a:t>
+            </a:r>
+            <a:r>
+              <a:rPr lang="en-GB" sz="1200" b="0" i="0" u="none" strike="noStrike" dirty="0">
+                <a:solidFill>
+                  <a:srgbClr val="000000"/>
+                </a:solidFill>
+                <a:effectLst/>
+                <a:latin typeface="Courier New" panose="02070309020205020404" pitchFamily="49" charset="0"/>
+              </a:rPr>
+              <a:t>)(x)</a:t>
+            </a:r>
+          </a:p>
+          <a:p>
+            <a:r>
+              <a:rPr lang="en-GB" sz="1200" b="0" i="0" u="none" strike="noStrike" dirty="0">
+                <a:solidFill>
+                  <a:srgbClr val="000000"/>
+                </a:solidFill>
+                <a:effectLst/>
+                <a:latin typeface="Courier New" panose="02070309020205020404" pitchFamily="49" charset="0"/>
+              </a:rPr>
+              <a:t>encoded = Flatten()(x)</a:t>
+            </a:r>
+          </a:p>
+          <a:p>
+            <a:r>
+              <a:rPr lang="en-GB" sz="1200" b="0" i="0" u="none" strike="noStrike" dirty="0">
+                <a:solidFill>
+                  <a:srgbClr val="008000"/>
+                </a:solidFill>
+                <a:effectLst/>
+                <a:latin typeface="Courier New" panose="02070309020205020404" pitchFamily="49" charset="0"/>
+              </a:rPr>
+              <a:t>#encoded = x</a:t>
+            </a:r>
+            <a:endParaRPr lang="en-GB" sz="1200" b="0" i="0" u="none" strike="noStrike" dirty="0">
+              <a:solidFill>
+                <a:srgbClr val="000000"/>
+              </a:solidFill>
+              <a:effectLst/>
+              <a:latin typeface="Courier New" panose="02070309020205020404" pitchFamily="49" charset="0"/>
+            </a:endParaRPr>
+          </a:p>
+          <a:p>
+            <a:br>
+              <a:rPr lang="en-GB" sz="1200" b="0" i="0" u="none" strike="noStrike" dirty="0">
+                <a:solidFill>
+                  <a:srgbClr val="000000"/>
+                </a:solidFill>
+                <a:effectLst/>
+                <a:latin typeface="Courier New" panose="02070309020205020404" pitchFamily="49" charset="0"/>
+              </a:rPr>
+            </a:br>
+            <a:r>
+              <a:rPr lang="en-GB" sz="1200" b="0" i="0" u="none" strike="noStrike" dirty="0">
+                <a:solidFill>
+                  <a:srgbClr val="000000"/>
+                </a:solidFill>
+                <a:effectLst/>
+                <a:latin typeface="Courier New" panose="02070309020205020404" pitchFamily="49" charset="0"/>
+              </a:rPr>
+              <a:t>x =  Conv2D(</a:t>
+            </a:r>
+            <a:r>
+              <a:rPr lang="en-GB" sz="1200" b="0" i="0" u="none" strike="noStrike" dirty="0">
+                <a:solidFill>
+                  <a:srgbClr val="09885A"/>
+                </a:solidFill>
+                <a:effectLst/>
+                <a:latin typeface="Courier New" panose="02070309020205020404" pitchFamily="49" charset="0"/>
+              </a:rPr>
+              <a:t>16</a:t>
+            </a:r>
+            <a:r>
+              <a:rPr lang="en-GB" sz="1200" b="0" i="0" u="none" strike="noStrike" dirty="0">
+                <a:solidFill>
+                  <a:srgbClr val="000000"/>
+                </a:solidFill>
+                <a:effectLst/>
+                <a:latin typeface="Courier New" panose="02070309020205020404" pitchFamily="49" charset="0"/>
+              </a:rPr>
+              <a:t>, (</a:t>
+            </a:r>
+            <a:r>
+              <a:rPr lang="en-GB" sz="1200" b="0" i="0" u="none" strike="noStrike" dirty="0">
+                <a:solidFill>
+                  <a:srgbClr val="09885A"/>
+                </a:solidFill>
+                <a:effectLst/>
+                <a:latin typeface="Courier New" panose="02070309020205020404" pitchFamily="49" charset="0"/>
+              </a:rPr>
+              <a:t>3</a:t>
+            </a:r>
+            <a:r>
+              <a:rPr lang="en-GB" sz="1200" b="0" i="0" u="none" strike="noStrike" dirty="0">
+                <a:solidFill>
+                  <a:srgbClr val="000000"/>
+                </a:solidFill>
+                <a:effectLst/>
+                <a:latin typeface="Courier New" panose="02070309020205020404" pitchFamily="49" charset="0"/>
+              </a:rPr>
+              <a:t>, </a:t>
+            </a:r>
+            <a:r>
+              <a:rPr lang="en-GB" sz="1200" b="0" i="0" u="none" strike="noStrike" dirty="0">
+                <a:solidFill>
+                  <a:srgbClr val="09885A"/>
+                </a:solidFill>
+                <a:effectLst/>
+                <a:latin typeface="Courier New" panose="02070309020205020404" pitchFamily="49" charset="0"/>
+              </a:rPr>
+              <a:t>3</a:t>
+            </a:r>
+            <a:r>
+              <a:rPr lang="en-GB" sz="1200" b="0" i="0" u="none" strike="noStrike" dirty="0">
+                <a:solidFill>
+                  <a:srgbClr val="000000"/>
+                </a:solidFill>
+                <a:effectLst/>
+                <a:latin typeface="Courier New" panose="02070309020205020404" pitchFamily="49" charset="0"/>
+              </a:rPr>
+              <a:t>), activation=</a:t>
+            </a:r>
+            <a:r>
+              <a:rPr lang="en-GB" sz="1200" b="0" i="0" u="none" strike="noStrike" dirty="0">
+                <a:solidFill>
+                  <a:srgbClr val="A31515"/>
+                </a:solidFill>
+                <a:effectLst/>
+                <a:latin typeface="Courier New" panose="02070309020205020404" pitchFamily="49" charset="0"/>
+              </a:rPr>
+              <a:t>'</a:t>
+            </a:r>
+            <a:r>
+              <a:rPr lang="en-GB" sz="1200" b="0" i="0" u="none" strike="noStrike" dirty="0" err="1">
+                <a:solidFill>
+                  <a:srgbClr val="A31515"/>
+                </a:solidFill>
+                <a:effectLst/>
+                <a:latin typeface="Courier New" panose="02070309020205020404" pitchFamily="49" charset="0"/>
+              </a:rPr>
+              <a:t>relu</a:t>
+            </a:r>
+            <a:r>
+              <a:rPr lang="en-GB" sz="1200" b="0" i="0" u="none" strike="noStrike" dirty="0">
+                <a:solidFill>
+                  <a:srgbClr val="A31515"/>
+                </a:solidFill>
+                <a:effectLst/>
+                <a:latin typeface="Courier New" panose="02070309020205020404" pitchFamily="49" charset="0"/>
+              </a:rPr>
+              <a:t>'</a:t>
+            </a:r>
+            <a:r>
+              <a:rPr lang="en-GB" sz="1200" b="0" i="0" u="none" strike="noStrike" dirty="0">
+                <a:solidFill>
+                  <a:srgbClr val="000000"/>
+                </a:solidFill>
+                <a:effectLst/>
+                <a:latin typeface="Courier New" panose="02070309020205020404" pitchFamily="49" charset="0"/>
+              </a:rPr>
+              <a:t>, padding=</a:t>
+            </a:r>
+            <a:r>
+              <a:rPr lang="en-GB" sz="1200" b="0" i="0" u="none" strike="noStrike" dirty="0">
+                <a:solidFill>
+                  <a:srgbClr val="A31515"/>
+                </a:solidFill>
+                <a:effectLst/>
+                <a:latin typeface="Courier New" panose="02070309020205020404" pitchFamily="49" charset="0"/>
+              </a:rPr>
+              <a:t>'same'</a:t>
+            </a:r>
+            <a:r>
+              <a:rPr lang="en-GB" sz="1200" b="0" i="0" u="none" strike="noStrike" dirty="0">
+                <a:solidFill>
+                  <a:srgbClr val="000000"/>
+                </a:solidFill>
+                <a:effectLst/>
+                <a:latin typeface="Courier New" panose="02070309020205020404" pitchFamily="49" charset="0"/>
+              </a:rPr>
+              <a:t>)(x)</a:t>
+            </a:r>
+          </a:p>
+          <a:p>
+            <a:r>
+              <a:rPr lang="en-GB" sz="1200" b="0" i="0" u="none" strike="noStrike" dirty="0">
+                <a:solidFill>
+                  <a:srgbClr val="000000"/>
+                </a:solidFill>
+                <a:effectLst/>
+                <a:latin typeface="Courier New" panose="02070309020205020404" pitchFamily="49" charset="0"/>
+              </a:rPr>
+              <a:t>x = UpSampling2D((</a:t>
+            </a:r>
+            <a:r>
+              <a:rPr lang="en-GB" sz="1200" b="0" i="0" u="none" strike="noStrike" dirty="0">
+                <a:solidFill>
+                  <a:srgbClr val="09885A"/>
+                </a:solidFill>
+                <a:effectLst/>
+                <a:latin typeface="Courier New" panose="02070309020205020404" pitchFamily="49" charset="0"/>
+              </a:rPr>
+              <a:t>2</a:t>
+            </a:r>
+            <a:r>
+              <a:rPr lang="en-GB" sz="1200" b="0" i="0" u="none" strike="noStrike" dirty="0">
+                <a:solidFill>
+                  <a:srgbClr val="000000"/>
+                </a:solidFill>
+                <a:effectLst/>
+                <a:latin typeface="Courier New" panose="02070309020205020404" pitchFamily="49" charset="0"/>
+              </a:rPr>
+              <a:t>, </a:t>
+            </a:r>
+            <a:r>
+              <a:rPr lang="en-GB" sz="1200" b="0" i="0" u="none" strike="noStrike" dirty="0">
+                <a:solidFill>
+                  <a:srgbClr val="09885A"/>
+                </a:solidFill>
+                <a:effectLst/>
+                <a:latin typeface="Courier New" panose="02070309020205020404" pitchFamily="49" charset="0"/>
+              </a:rPr>
+              <a:t>2</a:t>
+            </a:r>
+            <a:r>
+              <a:rPr lang="en-GB" sz="1200" b="0" i="0" u="none" strike="noStrike" dirty="0">
+                <a:solidFill>
+                  <a:srgbClr val="000000"/>
+                </a:solidFill>
+                <a:effectLst/>
+                <a:latin typeface="Courier New" panose="02070309020205020404" pitchFamily="49" charset="0"/>
+              </a:rPr>
+              <a:t>))(x)</a:t>
+            </a:r>
+          </a:p>
+          <a:p>
+            <a:r>
+              <a:rPr lang="en-GB" sz="1200" b="0" i="0" u="none" strike="noStrike" dirty="0">
+                <a:solidFill>
+                  <a:srgbClr val="000000"/>
+                </a:solidFill>
+                <a:effectLst/>
+                <a:latin typeface="Courier New" panose="02070309020205020404" pitchFamily="49" charset="0"/>
+              </a:rPr>
+              <a:t>x =  Conv2D(</a:t>
+            </a:r>
+            <a:r>
+              <a:rPr lang="en-GB" sz="1200" b="0" i="0" u="none" strike="noStrike" dirty="0">
+                <a:solidFill>
+                  <a:srgbClr val="09885A"/>
+                </a:solidFill>
+                <a:effectLst/>
+                <a:latin typeface="Courier New" panose="02070309020205020404" pitchFamily="49" charset="0"/>
+              </a:rPr>
+              <a:t>32</a:t>
+            </a:r>
+            <a:r>
+              <a:rPr lang="en-GB" sz="1200" b="0" i="0" u="none" strike="noStrike" dirty="0">
+                <a:solidFill>
+                  <a:srgbClr val="000000"/>
+                </a:solidFill>
+                <a:effectLst/>
+                <a:latin typeface="Courier New" panose="02070309020205020404" pitchFamily="49" charset="0"/>
+              </a:rPr>
+              <a:t>, (</a:t>
+            </a:r>
+            <a:r>
+              <a:rPr lang="en-GB" sz="1200" b="0" i="0" u="none" strike="noStrike" dirty="0">
+                <a:solidFill>
+                  <a:srgbClr val="09885A"/>
+                </a:solidFill>
+                <a:effectLst/>
+                <a:latin typeface="Courier New" panose="02070309020205020404" pitchFamily="49" charset="0"/>
+              </a:rPr>
+              <a:t>3</a:t>
+            </a:r>
+            <a:r>
+              <a:rPr lang="en-GB" sz="1200" b="0" i="0" u="none" strike="noStrike" dirty="0">
+                <a:solidFill>
+                  <a:srgbClr val="000000"/>
+                </a:solidFill>
+                <a:effectLst/>
+                <a:latin typeface="Courier New" panose="02070309020205020404" pitchFamily="49" charset="0"/>
+              </a:rPr>
+              <a:t>, </a:t>
+            </a:r>
+            <a:r>
+              <a:rPr lang="en-GB" sz="1200" b="0" i="0" u="none" strike="noStrike" dirty="0">
+                <a:solidFill>
+                  <a:srgbClr val="09885A"/>
+                </a:solidFill>
+                <a:effectLst/>
+                <a:latin typeface="Courier New" panose="02070309020205020404" pitchFamily="49" charset="0"/>
+              </a:rPr>
+              <a:t>3</a:t>
+            </a:r>
+            <a:r>
+              <a:rPr lang="en-GB" sz="1200" b="0" i="0" u="none" strike="noStrike" dirty="0">
+                <a:solidFill>
+                  <a:srgbClr val="000000"/>
+                </a:solidFill>
+                <a:effectLst/>
+                <a:latin typeface="Courier New" panose="02070309020205020404" pitchFamily="49" charset="0"/>
+              </a:rPr>
+              <a:t>), activation=</a:t>
+            </a:r>
+            <a:r>
+              <a:rPr lang="en-GB" sz="1200" b="0" i="0" u="none" strike="noStrike" dirty="0">
+                <a:solidFill>
+                  <a:srgbClr val="A31515"/>
+                </a:solidFill>
+                <a:effectLst/>
+                <a:latin typeface="Courier New" panose="02070309020205020404" pitchFamily="49" charset="0"/>
+              </a:rPr>
+              <a:t>'</a:t>
+            </a:r>
+            <a:r>
+              <a:rPr lang="en-GB" sz="1200" b="0" i="0" u="none" strike="noStrike" dirty="0" err="1">
+                <a:solidFill>
+                  <a:srgbClr val="A31515"/>
+                </a:solidFill>
+                <a:effectLst/>
+                <a:latin typeface="Courier New" panose="02070309020205020404" pitchFamily="49" charset="0"/>
+              </a:rPr>
+              <a:t>relu</a:t>
+            </a:r>
+            <a:r>
+              <a:rPr lang="en-GB" sz="1200" b="0" i="0" u="none" strike="noStrike" dirty="0">
+                <a:solidFill>
+                  <a:srgbClr val="A31515"/>
+                </a:solidFill>
+                <a:effectLst/>
+                <a:latin typeface="Courier New" panose="02070309020205020404" pitchFamily="49" charset="0"/>
+              </a:rPr>
+              <a:t>'</a:t>
+            </a:r>
+            <a:r>
+              <a:rPr lang="en-GB" sz="1200" b="0" i="0" u="none" strike="noStrike" dirty="0">
+                <a:solidFill>
+                  <a:srgbClr val="000000"/>
+                </a:solidFill>
+                <a:effectLst/>
+                <a:latin typeface="Courier New" panose="02070309020205020404" pitchFamily="49" charset="0"/>
+              </a:rPr>
+              <a:t>, padding=</a:t>
+            </a:r>
+            <a:r>
+              <a:rPr lang="en-GB" sz="1200" b="0" i="0" u="none" strike="noStrike" dirty="0">
+                <a:solidFill>
+                  <a:srgbClr val="A31515"/>
+                </a:solidFill>
+                <a:effectLst/>
+                <a:latin typeface="Courier New" panose="02070309020205020404" pitchFamily="49" charset="0"/>
+              </a:rPr>
+              <a:t>'same'</a:t>
+            </a:r>
+            <a:r>
+              <a:rPr lang="en-GB" sz="1200" b="0" i="0" u="none" strike="noStrike" dirty="0">
+                <a:solidFill>
+                  <a:srgbClr val="000000"/>
+                </a:solidFill>
+                <a:effectLst/>
+                <a:latin typeface="Courier New" panose="02070309020205020404" pitchFamily="49" charset="0"/>
+              </a:rPr>
+              <a:t>)(x)</a:t>
+            </a:r>
+          </a:p>
+          <a:p>
+            <a:r>
+              <a:rPr lang="en-GB" sz="1200" b="0" i="0" u="none" strike="noStrike" dirty="0">
+                <a:solidFill>
+                  <a:srgbClr val="008000"/>
+                </a:solidFill>
+                <a:effectLst/>
+                <a:latin typeface="Courier New" panose="02070309020205020404" pitchFamily="49" charset="0"/>
+              </a:rPr>
+              <a:t># this will help going back the original image dimensions</a:t>
+            </a:r>
+            <a:endParaRPr lang="en-GB" sz="1200" b="0" i="0" u="none" strike="noStrike" dirty="0">
+              <a:solidFill>
+                <a:srgbClr val="000000"/>
+              </a:solidFill>
+              <a:effectLst/>
+              <a:latin typeface="Courier New" panose="02070309020205020404" pitchFamily="49" charset="0"/>
+            </a:endParaRPr>
+          </a:p>
+          <a:p>
+            <a:r>
+              <a:rPr lang="en-GB" sz="1200" b="0" i="0" u="none" strike="noStrike" dirty="0">
+                <a:solidFill>
+                  <a:srgbClr val="000000"/>
+                </a:solidFill>
+                <a:effectLst/>
+                <a:latin typeface="Courier New" panose="02070309020205020404" pitchFamily="49" charset="0"/>
+              </a:rPr>
+              <a:t>x = UpSampling2D((</a:t>
+            </a:r>
+            <a:r>
+              <a:rPr lang="en-GB" sz="1200" b="0" i="0" u="none" strike="noStrike" dirty="0">
+                <a:solidFill>
+                  <a:srgbClr val="09885A"/>
+                </a:solidFill>
+                <a:effectLst/>
+                <a:latin typeface="Courier New" panose="02070309020205020404" pitchFamily="49" charset="0"/>
+              </a:rPr>
+              <a:t>2</a:t>
+            </a:r>
+            <a:r>
+              <a:rPr lang="en-GB" sz="1200" b="0" i="0" u="none" strike="noStrike" dirty="0">
+                <a:solidFill>
+                  <a:srgbClr val="000000"/>
+                </a:solidFill>
+                <a:effectLst/>
+                <a:latin typeface="Courier New" panose="02070309020205020404" pitchFamily="49" charset="0"/>
+              </a:rPr>
+              <a:t>, </a:t>
+            </a:r>
+            <a:r>
+              <a:rPr lang="en-GB" sz="1200" b="0" i="0" u="none" strike="noStrike" dirty="0">
+                <a:solidFill>
+                  <a:srgbClr val="09885A"/>
+                </a:solidFill>
+                <a:effectLst/>
+                <a:latin typeface="Courier New" panose="02070309020205020404" pitchFamily="49" charset="0"/>
+              </a:rPr>
+              <a:t>2</a:t>
+            </a:r>
+            <a:r>
+              <a:rPr lang="en-GB" sz="1200" b="0" i="0" u="none" strike="noStrike" dirty="0">
+                <a:solidFill>
+                  <a:srgbClr val="000000"/>
+                </a:solidFill>
+                <a:effectLst/>
+                <a:latin typeface="Courier New" panose="02070309020205020404" pitchFamily="49" charset="0"/>
+              </a:rPr>
+              <a:t>))(x)</a:t>
+            </a:r>
+          </a:p>
+          <a:p>
+            <a:br>
+              <a:rPr lang="en-GB" sz="1200" b="0" i="0" u="none" strike="noStrike" dirty="0">
+                <a:solidFill>
+                  <a:srgbClr val="000000"/>
+                </a:solidFill>
+                <a:effectLst/>
+                <a:latin typeface="Courier New" panose="02070309020205020404" pitchFamily="49" charset="0"/>
+              </a:rPr>
+            </a:br>
+            <a:r>
+              <a:rPr lang="en-GB" sz="1200" b="0" i="0" u="none" strike="noStrike" dirty="0">
+                <a:solidFill>
+                  <a:srgbClr val="000000"/>
+                </a:solidFill>
+                <a:effectLst/>
+                <a:latin typeface="Courier New" panose="02070309020205020404" pitchFamily="49" charset="0"/>
+              </a:rPr>
+              <a:t>decoded = Conv2D(</a:t>
+            </a:r>
+            <a:r>
+              <a:rPr lang="en-GB" sz="1200" b="0" i="0" u="none" strike="noStrike" dirty="0">
+                <a:solidFill>
+                  <a:srgbClr val="09885A"/>
+                </a:solidFill>
+                <a:effectLst/>
+                <a:latin typeface="Courier New" panose="02070309020205020404" pitchFamily="49" charset="0"/>
+              </a:rPr>
+              <a:t>1</a:t>
+            </a:r>
+            <a:r>
+              <a:rPr lang="en-GB" sz="1200" b="0" i="0" u="none" strike="noStrike" dirty="0">
+                <a:solidFill>
+                  <a:srgbClr val="000000"/>
+                </a:solidFill>
+                <a:effectLst/>
+                <a:latin typeface="Courier New" panose="02070309020205020404" pitchFamily="49" charset="0"/>
+              </a:rPr>
+              <a:t>, (</a:t>
+            </a:r>
+            <a:r>
+              <a:rPr lang="en-GB" sz="1200" b="0" i="0" u="none" strike="noStrike" dirty="0">
+                <a:solidFill>
+                  <a:srgbClr val="09885A"/>
+                </a:solidFill>
+                <a:effectLst/>
+                <a:latin typeface="Courier New" panose="02070309020205020404" pitchFamily="49" charset="0"/>
+              </a:rPr>
+              <a:t>3</a:t>
+            </a:r>
+            <a:r>
+              <a:rPr lang="en-GB" sz="1200" b="0" i="0" u="none" strike="noStrike" dirty="0">
+                <a:solidFill>
+                  <a:srgbClr val="000000"/>
+                </a:solidFill>
+                <a:effectLst/>
+                <a:latin typeface="Courier New" panose="02070309020205020404" pitchFamily="49" charset="0"/>
+              </a:rPr>
+              <a:t>, </a:t>
+            </a:r>
+            <a:r>
+              <a:rPr lang="en-GB" sz="1200" b="0" i="0" u="none" strike="noStrike" dirty="0">
+                <a:solidFill>
+                  <a:srgbClr val="09885A"/>
+                </a:solidFill>
+                <a:effectLst/>
+                <a:latin typeface="Courier New" panose="02070309020205020404" pitchFamily="49" charset="0"/>
+              </a:rPr>
+              <a:t>3</a:t>
+            </a:r>
+            <a:r>
+              <a:rPr lang="en-GB" sz="1200" b="0" i="0" u="none" strike="noStrike" dirty="0">
+                <a:solidFill>
+                  <a:srgbClr val="000000"/>
+                </a:solidFill>
+                <a:effectLst/>
+                <a:latin typeface="Courier New" panose="02070309020205020404" pitchFamily="49" charset="0"/>
+              </a:rPr>
+              <a:t>), padding=</a:t>
+            </a:r>
+            <a:r>
+              <a:rPr lang="en-GB" sz="1200" b="0" i="0" u="none" strike="noStrike" dirty="0">
+                <a:solidFill>
+                  <a:srgbClr val="A31515"/>
+                </a:solidFill>
+                <a:effectLst/>
+                <a:latin typeface="Courier New" panose="02070309020205020404" pitchFamily="49" charset="0"/>
+              </a:rPr>
+              <a:t>'same'</a:t>
+            </a:r>
+            <a:r>
+              <a:rPr lang="en-GB" sz="1200" b="0" i="0" u="none" strike="noStrike" dirty="0">
+                <a:solidFill>
+                  <a:srgbClr val="000000"/>
+                </a:solidFill>
+                <a:effectLst/>
+                <a:latin typeface="Courier New" panose="02070309020205020404" pitchFamily="49" charset="0"/>
+              </a:rPr>
+              <a:t>)(x)</a:t>
+            </a:r>
+          </a:p>
+        </p:txBody>
+      </p:sp>
+    </p:spTree>
+    <p:extLst>
+      <p:ext uri="{BB962C8B-B14F-4D97-AF65-F5344CB8AC3E}">
+        <p14:creationId xmlns:p14="http://schemas.microsoft.com/office/powerpoint/2010/main" val="2724663087"/>
+      </p:ext>
+    </p:extLst>
+  </p:cSld>
+  <p:clrMapOvr>
+    <a:masterClrMapping/>
+  </p:clrMapOvr>
+</p:sld>
+</file>
+
+<file path=ppt/slides/slide8.xml><?xml version="1.0" encoding="utf-8"?>
+<p:sld xmlns:a="http://schemas.openxmlformats.org/drawingml/2006/main" xmlns:r="http://schemas.openxmlformats.org/officeDocument/2006/relationships" xmlns:p="http://schemas.openxmlformats.org/presentationml/2006/main">
+  <p:cSld>
+    <p:spTree>
+      <p:nvGrpSpPr>
+        <p:cNvPr id="1" name=""/>
+        <p:cNvGrpSpPr/>
+        <p:nvPr/>
+      </p:nvGrpSpPr>
+      <p:grpSpPr>
+        <a:xfrm>
+          <a:off x="0" y="0"/>
+          <a:ext cx="0" cy="0"/>
+          <a:chOff x="0" y="0"/>
+          <a:chExt cx="0" cy="0"/>
+        </a:xfrm>
+      </p:grpSpPr>
+      <p:sp>
+        <p:nvSpPr>
           <p:cNvPr id="2" name="Title 1">
             <a:extLst>
               <a:ext uri="{FF2B5EF4-FFF2-40B4-BE49-F238E27FC236}">
-                <a16:creationId xmlns:a16="http://schemas.microsoft.com/office/drawing/2014/main" id="{695F0D4A-8296-A047-9CD6-1141E760CE81}"/>
+                <a16:creationId xmlns:a16="http://schemas.microsoft.com/office/drawing/2014/main" id="{98FAAC98-888A-6A42-960B-3B1F0140435F}"/>
               </a:ext>
             </a:extLst>
           </p:cNvPr>
@@ -8874,19 +10106,1480 @@
           <a:bodyPr/>
           <a:lstStyle/>
           <a:p>
-            <a:r>
-              <a:rPr lang="en-GB" dirty="0"/>
-              <a:t>Observations</a:t>
-            </a:r>
+            <a:endParaRPr lang="en-GB" dirty="0"/>
           </a:p>
         </p:txBody>
       </p:sp>
+      <p:pic>
+        <p:nvPicPr>
+          <p:cNvPr id="4" name="Content Placeholder 3">
+            <a:extLst>
+              <a:ext uri="{FF2B5EF4-FFF2-40B4-BE49-F238E27FC236}">
+                <a16:creationId xmlns:a16="http://schemas.microsoft.com/office/drawing/2014/main" id="{E2A862FC-4268-F243-B112-50C1581B3FBD}"/>
+              </a:ext>
+            </a:extLst>
+          </p:cNvPr>
+          <p:cNvPicPr>
+            <a:picLocks noGrp="1" noChangeAspect="1"/>
+          </p:cNvPicPr>
+          <p:nvPr>
+            <p:ph idx="1"/>
+          </p:nvPr>
+        </p:nvPicPr>
+        <p:blipFill>
+          <a:blip r:embed="rId2"/>
+          <a:stretch>
+            <a:fillRect/>
+          </a:stretch>
+        </p:blipFill>
+        <p:spPr>
+          <a:xfrm>
+            <a:off x="309449" y="365125"/>
+            <a:ext cx="2890951" cy="6005188"/>
+          </a:xfrm>
+          <a:prstGeom prst="rect">
+            <a:avLst/>
+          </a:prstGeom>
+        </p:spPr>
+      </p:pic>
+      <p:pic>
+        <p:nvPicPr>
+          <p:cNvPr id="5" name="Picture 4">
+            <a:extLst>
+              <a:ext uri="{FF2B5EF4-FFF2-40B4-BE49-F238E27FC236}">
+                <a16:creationId xmlns:a16="http://schemas.microsoft.com/office/drawing/2014/main" id="{07EB3576-97BE-4441-B93E-75C55473B232}"/>
+              </a:ext>
+            </a:extLst>
+          </p:cNvPr>
+          <p:cNvPicPr>
+            <a:picLocks noChangeAspect="1"/>
+          </p:cNvPicPr>
+          <p:nvPr/>
+        </p:nvPicPr>
+        <p:blipFill>
+          <a:blip r:embed="rId3"/>
+          <a:stretch>
+            <a:fillRect/>
+          </a:stretch>
+        </p:blipFill>
+        <p:spPr>
+          <a:xfrm>
+            <a:off x="2989034" y="501277"/>
+            <a:ext cx="2888027" cy="5505640"/>
+          </a:xfrm>
+          <a:prstGeom prst="rect">
+            <a:avLst/>
+          </a:prstGeom>
+        </p:spPr>
+      </p:pic>
       <p:sp>
         <p:nvSpPr>
-          <p:cNvPr id="3" name="Content Placeholder 2">
+          <p:cNvPr id="6" name="Rectangle 5">
             <a:extLst>
               <a:ext uri="{FF2B5EF4-FFF2-40B4-BE49-F238E27FC236}">
-                <a16:creationId xmlns:a16="http://schemas.microsoft.com/office/drawing/2014/main" id="{B0E0D38F-3D2F-6B42-BFC7-780B2D6EF56C}"/>
+                <a16:creationId xmlns:a16="http://schemas.microsoft.com/office/drawing/2014/main" id="{7E486057-94CA-614B-9E8E-B37F0E5C9B2D}"/>
+              </a:ext>
+            </a:extLst>
+          </p:cNvPr>
+          <p:cNvSpPr/>
+          <p:nvPr/>
+        </p:nvSpPr>
+        <p:spPr>
+          <a:xfrm>
+            <a:off x="5665694" y="3254097"/>
+            <a:ext cx="6096000" cy="3139321"/>
+          </a:xfrm>
+          <a:prstGeom prst="rect">
+            <a:avLst/>
+          </a:prstGeom>
+        </p:spPr>
+        <p:txBody>
+          <a:bodyPr>
+            <a:spAutoFit/>
+          </a:bodyPr>
+          <a:lstStyle/>
+          <a:p>
+            <a:r>
+              <a:rPr lang="en-GB" sz="1100" b="0" i="0" u="none" strike="noStrike" dirty="0">
+                <a:solidFill>
+                  <a:srgbClr val="000000"/>
+                </a:solidFill>
+                <a:effectLst/>
+                <a:latin typeface="Courier New" panose="02070309020205020404" pitchFamily="49" charset="0"/>
+              </a:rPr>
+              <a:t>x =  Conv2D(</a:t>
+            </a:r>
+            <a:r>
+              <a:rPr lang="en-GB" sz="1100" b="0" i="0" u="none" strike="noStrike" dirty="0">
+                <a:solidFill>
+                  <a:srgbClr val="09885A"/>
+                </a:solidFill>
+                <a:effectLst/>
+                <a:latin typeface="Courier New" panose="02070309020205020404" pitchFamily="49" charset="0"/>
+              </a:rPr>
+              <a:t>128</a:t>
+            </a:r>
+            <a:r>
+              <a:rPr lang="en-GB" sz="1100" b="0" i="0" u="none" strike="noStrike" dirty="0">
+                <a:solidFill>
+                  <a:srgbClr val="000000"/>
+                </a:solidFill>
+                <a:effectLst/>
+                <a:latin typeface="Courier New" panose="02070309020205020404" pitchFamily="49" charset="0"/>
+              </a:rPr>
+              <a:t>, (</a:t>
+            </a:r>
+            <a:r>
+              <a:rPr lang="en-GB" sz="1100" b="0" i="0" u="none" strike="noStrike" dirty="0">
+                <a:solidFill>
+                  <a:srgbClr val="09885A"/>
+                </a:solidFill>
+                <a:effectLst/>
+                <a:latin typeface="Courier New" panose="02070309020205020404" pitchFamily="49" charset="0"/>
+              </a:rPr>
+              <a:t>5</a:t>
+            </a:r>
+            <a:r>
+              <a:rPr lang="en-GB" sz="1100" b="0" i="0" u="none" strike="noStrike" dirty="0">
+                <a:solidFill>
+                  <a:srgbClr val="000000"/>
+                </a:solidFill>
+                <a:effectLst/>
+                <a:latin typeface="Courier New" panose="02070309020205020404" pitchFamily="49" charset="0"/>
+              </a:rPr>
+              <a:t>, </a:t>
+            </a:r>
+            <a:r>
+              <a:rPr lang="en-GB" sz="1100" b="0" i="0" u="none" strike="noStrike" dirty="0">
+                <a:solidFill>
+                  <a:srgbClr val="09885A"/>
+                </a:solidFill>
+                <a:effectLst/>
+                <a:latin typeface="Courier New" panose="02070309020205020404" pitchFamily="49" charset="0"/>
+              </a:rPr>
+              <a:t>5</a:t>
+            </a:r>
+            <a:r>
+              <a:rPr lang="en-GB" sz="1100" b="0" i="0" u="none" strike="noStrike" dirty="0">
+                <a:solidFill>
+                  <a:srgbClr val="000000"/>
+                </a:solidFill>
+                <a:effectLst/>
+                <a:latin typeface="Courier New" panose="02070309020205020404" pitchFamily="49" charset="0"/>
+              </a:rPr>
+              <a:t>), activation=</a:t>
+            </a:r>
+            <a:r>
+              <a:rPr lang="en-GB" sz="1100" b="0" i="0" u="none" strike="noStrike" dirty="0">
+                <a:solidFill>
+                  <a:srgbClr val="A31515"/>
+                </a:solidFill>
+                <a:effectLst/>
+                <a:latin typeface="Courier New" panose="02070309020205020404" pitchFamily="49" charset="0"/>
+              </a:rPr>
+              <a:t>'</a:t>
+            </a:r>
+            <a:r>
+              <a:rPr lang="en-GB" sz="1100" b="0" i="0" u="none" strike="noStrike" dirty="0" err="1">
+                <a:solidFill>
+                  <a:srgbClr val="A31515"/>
+                </a:solidFill>
+                <a:effectLst/>
+                <a:latin typeface="Courier New" panose="02070309020205020404" pitchFamily="49" charset="0"/>
+              </a:rPr>
+              <a:t>relu</a:t>
+            </a:r>
+            <a:r>
+              <a:rPr lang="en-GB" sz="1100" b="0" i="0" u="none" strike="noStrike" dirty="0">
+                <a:solidFill>
+                  <a:srgbClr val="A31515"/>
+                </a:solidFill>
+                <a:effectLst/>
+                <a:latin typeface="Courier New" panose="02070309020205020404" pitchFamily="49" charset="0"/>
+              </a:rPr>
+              <a:t>'</a:t>
+            </a:r>
+            <a:r>
+              <a:rPr lang="en-GB" sz="1100" b="0" i="0" u="none" strike="noStrike" dirty="0">
+                <a:solidFill>
+                  <a:srgbClr val="000000"/>
+                </a:solidFill>
+                <a:effectLst/>
+                <a:latin typeface="Courier New" panose="02070309020205020404" pitchFamily="49" charset="0"/>
+              </a:rPr>
+              <a:t>, padding=</a:t>
+            </a:r>
+            <a:r>
+              <a:rPr lang="en-GB" sz="1100" b="0" i="0" u="none" strike="noStrike" dirty="0">
+                <a:solidFill>
+                  <a:srgbClr val="A31515"/>
+                </a:solidFill>
+                <a:effectLst/>
+                <a:latin typeface="Courier New" panose="02070309020205020404" pitchFamily="49" charset="0"/>
+              </a:rPr>
+              <a:t>'same'</a:t>
+            </a:r>
+            <a:r>
+              <a:rPr lang="en-GB" sz="1100" b="0" i="0" u="none" strike="noStrike" dirty="0">
+                <a:solidFill>
+                  <a:srgbClr val="000000"/>
+                </a:solidFill>
+                <a:effectLst/>
+                <a:latin typeface="Courier New" panose="02070309020205020404" pitchFamily="49" charset="0"/>
+              </a:rPr>
+              <a:t>)(</a:t>
+            </a:r>
+            <a:r>
+              <a:rPr lang="en-GB" sz="1100" b="0" i="0" u="none" strike="noStrike" dirty="0" err="1">
+                <a:solidFill>
+                  <a:srgbClr val="000000"/>
+                </a:solidFill>
+                <a:effectLst/>
+                <a:latin typeface="Courier New" panose="02070309020205020404" pitchFamily="49" charset="0"/>
+              </a:rPr>
+              <a:t>input_img</a:t>
+            </a:r>
+            <a:r>
+              <a:rPr lang="en-GB" sz="1100" b="0" i="0" u="none" strike="noStrike" dirty="0">
+                <a:solidFill>
+                  <a:srgbClr val="000000"/>
+                </a:solidFill>
+                <a:effectLst/>
+                <a:latin typeface="Courier New" panose="02070309020205020404" pitchFamily="49" charset="0"/>
+              </a:rPr>
+              <a:t>)</a:t>
+            </a:r>
+          </a:p>
+          <a:p>
+            <a:r>
+              <a:rPr lang="en-GB" sz="1100" b="0" i="0" u="none" strike="noStrike" dirty="0">
+                <a:solidFill>
+                  <a:srgbClr val="000000"/>
+                </a:solidFill>
+                <a:effectLst/>
+                <a:latin typeface="Courier New" panose="02070309020205020404" pitchFamily="49" charset="0"/>
+              </a:rPr>
+              <a:t>x = MaxPooling2D((</a:t>
+            </a:r>
+            <a:r>
+              <a:rPr lang="en-GB" sz="1100" b="0" i="0" u="none" strike="noStrike" dirty="0">
+                <a:solidFill>
+                  <a:srgbClr val="09885A"/>
+                </a:solidFill>
+                <a:effectLst/>
+                <a:latin typeface="Courier New" panose="02070309020205020404" pitchFamily="49" charset="0"/>
+              </a:rPr>
+              <a:t>2</a:t>
+            </a:r>
+            <a:r>
+              <a:rPr lang="en-GB" sz="1100" b="0" i="0" u="none" strike="noStrike" dirty="0">
+                <a:solidFill>
+                  <a:srgbClr val="000000"/>
+                </a:solidFill>
+                <a:effectLst/>
+                <a:latin typeface="Courier New" panose="02070309020205020404" pitchFamily="49" charset="0"/>
+              </a:rPr>
+              <a:t>, </a:t>
+            </a:r>
+            <a:r>
+              <a:rPr lang="en-GB" sz="1100" b="0" i="0" u="none" strike="noStrike" dirty="0">
+                <a:solidFill>
+                  <a:srgbClr val="09885A"/>
+                </a:solidFill>
+                <a:effectLst/>
+                <a:latin typeface="Courier New" panose="02070309020205020404" pitchFamily="49" charset="0"/>
+              </a:rPr>
+              <a:t>2</a:t>
+            </a:r>
+            <a:r>
+              <a:rPr lang="en-GB" sz="1100" b="0" i="0" u="none" strike="noStrike" dirty="0">
+                <a:solidFill>
+                  <a:srgbClr val="000000"/>
+                </a:solidFill>
+                <a:effectLst/>
+                <a:latin typeface="Courier New" panose="02070309020205020404" pitchFamily="49" charset="0"/>
+              </a:rPr>
+              <a:t>), padding=</a:t>
+            </a:r>
+            <a:r>
+              <a:rPr lang="en-GB" sz="1100" b="0" i="0" u="none" strike="noStrike" dirty="0">
+                <a:solidFill>
+                  <a:srgbClr val="A31515"/>
+                </a:solidFill>
+                <a:effectLst/>
+                <a:latin typeface="Courier New" panose="02070309020205020404" pitchFamily="49" charset="0"/>
+              </a:rPr>
+              <a:t>'same'</a:t>
+            </a:r>
+            <a:r>
+              <a:rPr lang="en-GB" sz="1100" b="0" i="0" u="none" strike="noStrike" dirty="0">
+                <a:solidFill>
+                  <a:srgbClr val="000000"/>
+                </a:solidFill>
+                <a:effectLst/>
+                <a:latin typeface="Courier New" panose="02070309020205020404" pitchFamily="49" charset="0"/>
+              </a:rPr>
+              <a:t>)(x)</a:t>
+            </a:r>
+          </a:p>
+          <a:p>
+            <a:r>
+              <a:rPr lang="en-GB" sz="1100" b="0" i="0" u="none" strike="noStrike" dirty="0">
+                <a:solidFill>
+                  <a:srgbClr val="000000"/>
+                </a:solidFill>
+                <a:effectLst/>
+                <a:latin typeface="Courier New" panose="02070309020205020404" pitchFamily="49" charset="0"/>
+              </a:rPr>
+              <a:t>x = Conv2D(</a:t>
+            </a:r>
+            <a:r>
+              <a:rPr lang="en-GB" sz="1100" b="0" i="0" u="none" strike="noStrike" dirty="0">
+                <a:solidFill>
+                  <a:srgbClr val="09885A"/>
+                </a:solidFill>
+                <a:effectLst/>
+                <a:latin typeface="Courier New" panose="02070309020205020404" pitchFamily="49" charset="0"/>
+              </a:rPr>
+              <a:t>64</a:t>
+            </a:r>
+            <a:r>
+              <a:rPr lang="en-GB" sz="1100" b="0" i="0" u="none" strike="noStrike" dirty="0">
+                <a:solidFill>
+                  <a:srgbClr val="000000"/>
+                </a:solidFill>
+                <a:effectLst/>
+                <a:latin typeface="Courier New" panose="02070309020205020404" pitchFamily="49" charset="0"/>
+              </a:rPr>
+              <a:t>, (</a:t>
+            </a:r>
+            <a:r>
+              <a:rPr lang="en-GB" sz="1100" b="0" i="0" u="none" strike="noStrike" dirty="0">
+                <a:solidFill>
+                  <a:srgbClr val="09885A"/>
+                </a:solidFill>
+                <a:effectLst/>
+                <a:latin typeface="Courier New" panose="02070309020205020404" pitchFamily="49" charset="0"/>
+              </a:rPr>
+              <a:t>5</a:t>
+            </a:r>
+            <a:r>
+              <a:rPr lang="en-GB" sz="1100" b="0" i="0" u="none" strike="noStrike" dirty="0">
+                <a:solidFill>
+                  <a:srgbClr val="000000"/>
+                </a:solidFill>
+                <a:effectLst/>
+                <a:latin typeface="Courier New" panose="02070309020205020404" pitchFamily="49" charset="0"/>
+              </a:rPr>
+              <a:t>, </a:t>
+            </a:r>
+            <a:r>
+              <a:rPr lang="en-GB" sz="1100" b="0" i="0" u="none" strike="noStrike" dirty="0">
+                <a:solidFill>
+                  <a:srgbClr val="09885A"/>
+                </a:solidFill>
+                <a:effectLst/>
+                <a:latin typeface="Courier New" panose="02070309020205020404" pitchFamily="49" charset="0"/>
+              </a:rPr>
+              <a:t>5</a:t>
+            </a:r>
+            <a:r>
+              <a:rPr lang="en-GB" sz="1100" b="0" i="0" u="none" strike="noStrike" dirty="0">
+                <a:solidFill>
+                  <a:srgbClr val="000000"/>
+                </a:solidFill>
+                <a:effectLst/>
+                <a:latin typeface="Courier New" panose="02070309020205020404" pitchFamily="49" charset="0"/>
+              </a:rPr>
+              <a:t>), activation=</a:t>
+            </a:r>
+            <a:r>
+              <a:rPr lang="en-GB" sz="1100" b="0" i="0" u="none" strike="noStrike" dirty="0">
+                <a:solidFill>
+                  <a:srgbClr val="A31515"/>
+                </a:solidFill>
+                <a:effectLst/>
+                <a:latin typeface="Courier New" panose="02070309020205020404" pitchFamily="49" charset="0"/>
+              </a:rPr>
+              <a:t>'</a:t>
+            </a:r>
+            <a:r>
+              <a:rPr lang="en-GB" sz="1100" b="0" i="0" u="none" strike="noStrike" dirty="0" err="1">
+                <a:solidFill>
+                  <a:srgbClr val="A31515"/>
+                </a:solidFill>
+                <a:effectLst/>
+                <a:latin typeface="Courier New" panose="02070309020205020404" pitchFamily="49" charset="0"/>
+              </a:rPr>
+              <a:t>relu</a:t>
+            </a:r>
+            <a:r>
+              <a:rPr lang="en-GB" sz="1100" b="0" i="0" u="none" strike="noStrike" dirty="0">
+                <a:solidFill>
+                  <a:srgbClr val="A31515"/>
+                </a:solidFill>
+                <a:effectLst/>
+                <a:latin typeface="Courier New" panose="02070309020205020404" pitchFamily="49" charset="0"/>
+              </a:rPr>
+              <a:t>'</a:t>
+            </a:r>
+            <a:r>
+              <a:rPr lang="en-GB" sz="1100" b="0" i="0" u="none" strike="noStrike" dirty="0">
+                <a:solidFill>
+                  <a:srgbClr val="000000"/>
+                </a:solidFill>
+                <a:effectLst/>
+                <a:latin typeface="Courier New" panose="02070309020205020404" pitchFamily="49" charset="0"/>
+              </a:rPr>
+              <a:t>, padding=</a:t>
+            </a:r>
+            <a:r>
+              <a:rPr lang="en-GB" sz="1100" b="0" i="0" u="none" strike="noStrike" dirty="0">
+                <a:solidFill>
+                  <a:srgbClr val="A31515"/>
+                </a:solidFill>
+                <a:effectLst/>
+                <a:latin typeface="Courier New" panose="02070309020205020404" pitchFamily="49" charset="0"/>
+              </a:rPr>
+              <a:t>'same'</a:t>
+            </a:r>
+            <a:r>
+              <a:rPr lang="en-GB" sz="1100" b="0" i="0" u="none" strike="noStrike" dirty="0">
+                <a:solidFill>
+                  <a:srgbClr val="000000"/>
+                </a:solidFill>
+                <a:effectLst/>
+                <a:latin typeface="Courier New" panose="02070309020205020404" pitchFamily="49" charset="0"/>
+              </a:rPr>
+              <a:t>)(x)</a:t>
+            </a:r>
+          </a:p>
+          <a:p>
+            <a:r>
+              <a:rPr lang="en-GB" sz="1100" b="0" i="0" u="none" strike="noStrike" dirty="0">
+                <a:solidFill>
+                  <a:srgbClr val="000000"/>
+                </a:solidFill>
+                <a:effectLst/>
+                <a:latin typeface="Courier New" panose="02070309020205020404" pitchFamily="49" charset="0"/>
+              </a:rPr>
+              <a:t>x = MaxPooling2D((</a:t>
+            </a:r>
+            <a:r>
+              <a:rPr lang="en-GB" sz="1100" b="0" i="0" u="none" strike="noStrike" dirty="0">
+                <a:solidFill>
+                  <a:srgbClr val="09885A"/>
+                </a:solidFill>
+                <a:effectLst/>
+                <a:latin typeface="Courier New" panose="02070309020205020404" pitchFamily="49" charset="0"/>
+              </a:rPr>
+              <a:t>2</a:t>
+            </a:r>
+            <a:r>
+              <a:rPr lang="en-GB" sz="1100" b="0" i="0" u="none" strike="noStrike" dirty="0">
+                <a:solidFill>
+                  <a:srgbClr val="000000"/>
+                </a:solidFill>
+                <a:effectLst/>
+                <a:latin typeface="Courier New" panose="02070309020205020404" pitchFamily="49" charset="0"/>
+              </a:rPr>
+              <a:t>, </a:t>
+            </a:r>
+            <a:r>
+              <a:rPr lang="en-GB" sz="1100" b="0" i="0" u="none" strike="noStrike" dirty="0">
+                <a:solidFill>
+                  <a:srgbClr val="09885A"/>
+                </a:solidFill>
+                <a:effectLst/>
+                <a:latin typeface="Courier New" panose="02070309020205020404" pitchFamily="49" charset="0"/>
+              </a:rPr>
+              <a:t>2</a:t>
+            </a:r>
+            <a:r>
+              <a:rPr lang="en-GB" sz="1100" b="0" i="0" u="none" strike="noStrike" dirty="0">
+                <a:solidFill>
+                  <a:srgbClr val="000000"/>
+                </a:solidFill>
+                <a:effectLst/>
+                <a:latin typeface="Courier New" panose="02070309020205020404" pitchFamily="49" charset="0"/>
+              </a:rPr>
+              <a:t>), padding=</a:t>
+            </a:r>
+            <a:r>
+              <a:rPr lang="en-GB" sz="1100" b="0" i="0" u="none" strike="noStrike" dirty="0">
+                <a:solidFill>
+                  <a:srgbClr val="A31515"/>
+                </a:solidFill>
+                <a:effectLst/>
+                <a:latin typeface="Courier New" panose="02070309020205020404" pitchFamily="49" charset="0"/>
+              </a:rPr>
+              <a:t>'same'</a:t>
+            </a:r>
+            <a:r>
+              <a:rPr lang="en-GB" sz="1100" b="0" i="0" u="none" strike="noStrike" dirty="0">
+                <a:solidFill>
+                  <a:srgbClr val="000000"/>
+                </a:solidFill>
+                <a:effectLst/>
+                <a:latin typeface="Courier New" panose="02070309020205020404" pitchFamily="49" charset="0"/>
+              </a:rPr>
+              <a:t>)(x)</a:t>
+            </a:r>
+          </a:p>
+          <a:p>
+            <a:r>
+              <a:rPr lang="en-GB" sz="1100" b="0" i="0" u="none" strike="noStrike" dirty="0">
+                <a:solidFill>
+                  <a:srgbClr val="000000"/>
+                </a:solidFill>
+                <a:effectLst/>
+                <a:latin typeface="Courier New" panose="02070309020205020404" pitchFamily="49" charset="0"/>
+              </a:rPr>
+              <a:t>x = Conv2D(</a:t>
+            </a:r>
+            <a:r>
+              <a:rPr lang="en-GB" sz="1100" b="0" i="0" u="none" strike="noStrike" dirty="0">
+                <a:solidFill>
+                  <a:srgbClr val="09885A"/>
+                </a:solidFill>
+                <a:effectLst/>
+                <a:latin typeface="Courier New" panose="02070309020205020404" pitchFamily="49" charset="0"/>
+              </a:rPr>
+              <a:t>32</a:t>
+            </a:r>
+            <a:r>
+              <a:rPr lang="en-GB" sz="1100" b="0" i="0" u="none" strike="noStrike" dirty="0">
+                <a:solidFill>
+                  <a:srgbClr val="000000"/>
+                </a:solidFill>
+                <a:effectLst/>
+                <a:latin typeface="Courier New" panose="02070309020205020404" pitchFamily="49" charset="0"/>
+              </a:rPr>
+              <a:t>, (</a:t>
+            </a:r>
+            <a:r>
+              <a:rPr lang="en-GB" sz="1100" b="0" i="0" u="none" strike="noStrike" dirty="0">
+                <a:solidFill>
+                  <a:srgbClr val="09885A"/>
+                </a:solidFill>
+                <a:effectLst/>
+                <a:latin typeface="Courier New" panose="02070309020205020404" pitchFamily="49" charset="0"/>
+              </a:rPr>
+              <a:t>3</a:t>
+            </a:r>
+            <a:r>
+              <a:rPr lang="en-GB" sz="1100" b="0" i="0" u="none" strike="noStrike" dirty="0">
+                <a:solidFill>
+                  <a:srgbClr val="000000"/>
+                </a:solidFill>
+                <a:effectLst/>
+                <a:latin typeface="Courier New" panose="02070309020205020404" pitchFamily="49" charset="0"/>
+              </a:rPr>
+              <a:t>, </a:t>
+            </a:r>
+            <a:r>
+              <a:rPr lang="en-GB" sz="1100" b="0" i="0" u="none" strike="noStrike" dirty="0">
+                <a:solidFill>
+                  <a:srgbClr val="09885A"/>
+                </a:solidFill>
+                <a:effectLst/>
+                <a:latin typeface="Courier New" panose="02070309020205020404" pitchFamily="49" charset="0"/>
+              </a:rPr>
+              <a:t>3</a:t>
+            </a:r>
+            <a:r>
+              <a:rPr lang="en-GB" sz="1100" b="0" i="0" u="none" strike="noStrike" dirty="0">
+                <a:solidFill>
+                  <a:srgbClr val="000000"/>
+                </a:solidFill>
+                <a:effectLst/>
+                <a:latin typeface="Courier New" panose="02070309020205020404" pitchFamily="49" charset="0"/>
+              </a:rPr>
+              <a:t>), activation=</a:t>
+            </a:r>
+            <a:r>
+              <a:rPr lang="en-GB" sz="1100" b="0" i="0" u="none" strike="noStrike" dirty="0">
+                <a:solidFill>
+                  <a:srgbClr val="A31515"/>
+                </a:solidFill>
+                <a:effectLst/>
+                <a:latin typeface="Courier New" panose="02070309020205020404" pitchFamily="49" charset="0"/>
+              </a:rPr>
+              <a:t>'</a:t>
+            </a:r>
+            <a:r>
+              <a:rPr lang="en-GB" sz="1100" b="0" i="0" u="none" strike="noStrike" dirty="0" err="1">
+                <a:solidFill>
+                  <a:srgbClr val="A31515"/>
+                </a:solidFill>
+                <a:effectLst/>
+                <a:latin typeface="Courier New" panose="02070309020205020404" pitchFamily="49" charset="0"/>
+              </a:rPr>
+              <a:t>relu</a:t>
+            </a:r>
+            <a:r>
+              <a:rPr lang="en-GB" sz="1100" b="0" i="0" u="none" strike="noStrike" dirty="0">
+                <a:solidFill>
+                  <a:srgbClr val="A31515"/>
+                </a:solidFill>
+                <a:effectLst/>
+                <a:latin typeface="Courier New" panose="02070309020205020404" pitchFamily="49" charset="0"/>
+              </a:rPr>
+              <a:t>'</a:t>
+            </a:r>
+            <a:r>
+              <a:rPr lang="en-GB" sz="1100" b="0" i="0" u="none" strike="noStrike" dirty="0">
+                <a:solidFill>
+                  <a:srgbClr val="000000"/>
+                </a:solidFill>
+                <a:effectLst/>
+                <a:latin typeface="Courier New" panose="02070309020205020404" pitchFamily="49" charset="0"/>
+              </a:rPr>
+              <a:t>, padding=</a:t>
+            </a:r>
+            <a:r>
+              <a:rPr lang="en-GB" sz="1100" b="0" i="0" u="none" strike="noStrike" dirty="0">
+                <a:solidFill>
+                  <a:srgbClr val="A31515"/>
+                </a:solidFill>
+                <a:effectLst/>
+                <a:latin typeface="Courier New" panose="02070309020205020404" pitchFamily="49" charset="0"/>
+              </a:rPr>
+              <a:t>'same'</a:t>
+            </a:r>
+            <a:r>
+              <a:rPr lang="en-GB" sz="1100" b="0" i="0" u="none" strike="noStrike" dirty="0">
+                <a:solidFill>
+                  <a:srgbClr val="000000"/>
+                </a:solidFill>
+                <a:effectLst/>
+                <a:latin typeface="Courier New" panose="02070309020205020404" pitchFamily="49" charset="0"/>
+              </a:rPr>
+              <a:t>)(x)</a:t>
+            </a:r>
+          </a:p>
+          <a:p>
+            <a:r>
+              <a:rPr lang="en-GB" sz="1100" b="0" i="0" u="none" strike="noStrike" dirty="0">
+                <a:solidFill>
+                  <a:srgbClr val="000000"/>
+                </a:solidFill>
+                <a:effectLst/>
+                <a:latin typeface="Courier New" panose="02070309020205020404" pitchFamily="49" charset="0"/>
+              </a:rPr>
+              <a:t>x = MaxPooling2D((</a:t>
+            </a:r>
+            <a:r>
+              <a:rPr lang="en-GB" sz="1100" b="0" i="0" u="none" strike="noStrike" dirty="0">
+                <a:solidFill>
+                  <a:srgbClr val="09885A"/>
+                </a:solidFill>
+                <a:effectLst/>
+                <a:latin typeface="Courier New" panose="02070309020205020404" pitchFamily="49" charset="0"/>
+              </a:rPr>
+              <a:t>2</a:t>
+            </a:r>
+            <a:r>
+              <a:rPr lang="en-GB" sz="1100" b="0" i="0" u="none" strike="noStrike" dirty="0">
+                <a:solidFill>
+                  <a:srgbClr val="000000"/>
+                </a:solidFill>
+                <a:effectLst/>
+                <a:latin typeface="Courier New" panose="02070309020205020404" pitchFamily="49" charset="0"/>
+              </a:rPr>
+              <a:t>, </a:t>
+            </a:r>
+            <a:r>
+              <a:rPr lang="en-GB" sz="1100" b="0" i="0" u="none" strike="noStrike" dirty="0">
+                <a:solidFill>
+                  <a:srgbClr val="09885A"/>
+                </a:solidFill>
+                <a:effectLst/>
+                <a:latin typeface="Courier New" panose="02070309020205020404" pitchFamily="49" charset="0"/>
+              </a:rPr>
+              <a:t>2</a:t>
+            </a:r>
+            <a:r>
+              <a:rPr lang="en-GB" sz="1100" b="0" i="0" u="none" strike="noStrike" dirty="0">
+                <a:solidFill>
+                  <a:srgbClr val="000000"/>
+                </a:solidFill>
+                <a:effectLst/>
+                <a:latin typeface="Courier New" panose="02070309020205020404" pitchFamily="49" charset="0"/>
+              </a:rPr>
+              <a:t>), padding=</a:t>
+            </a:r>
+            <a:r>
+              <a:rPr lang="en-GB" sz="1100" b="0" i="0" u="none" strike="noStrike" dirty="0">
+                <a:solidFill>
+                  <a:srgbClr val="A31515"/>
+                </a:solidFill>
+                <a:effectLst/>
+                <a:latin typeface="Courier New" panose="02070309020205020404" pitchFamily="49" charset="0"/>
+              </a:rPr>
+              <a:t>'same'</a:t>
+            </a:r>
+            <a:r>
+              <a:rPr lang="en-GB" sz="1100" b="0" i="0" u="none" strike="noStrike" dirty="0">
+                <a:solidFill>
+                  <a:srgbClr val="000000"/>
+                </a:solidFill>
+                <a:effectLst/>
+                <a:latin typeface="Courier New" panose="02070309020205020404" pitchFamily="49" charset="0"/>
+              </a:rPr>
+              <a:t>)(x)</a:t>
+            </a:r>
+          </a:p>
+          <a:p>
+            <a:r>
+              <a:rPr lang="en-GB" sz="1100" b="0" i="0" u="none" strike="noStrike" dirty="0">
+                <a:solidFill>
+                  <a:srgbClr val="000000"/>
+                </a:solidFill>
+                <a:effectLst/>
+                <a:latin typeface="Courier New" panose="02070309020205020404" pitchFamily="49" charset="0"/>
+              </a:rPr>
+              <a:t>encoded = Flatten()(x)</a:t>
+            </a:r>
+          </a:p>
+          <a:p>
+            <a:r>
+              <a:rPr lang="en-GB" sz="1100" b="0" i="0" u="none" strike="noStrike" dirty="0">
+                <a:solidFill>
+                  <a:srgbClr val="008000"/>
+                </a:solidFill>
+                <a:effectLst/>
+                <a:latin typeface="Courier New" panose="02070309020205020404" pitchFamily="49" charset="0"/>
+              </a:rPr>
+              <a:t>#encoded = x</a:t>
+            </a:r>
+            <a:endParaRPr lang="en-GB" sz="1100" b="0" i="0" u="none" strike="noStrike" dirty="0">
+              <a:solidFill>
+                <a:srgbClr val="000000"/>
+              </a:solidFill>
+              <a:effectLst/>
+              <a:latin typeface="Courier New" panose="02070309020205020404" pitchFamily="49" charset="0"/>
+            </a:endParaRPr>
+          </a:p>
+          <a:p>
+            <a:br>
+              <a:rPr lang="en-GB" sz="1100" b="0" i="0" u="none" strike="noStrike" dirty="0">
+                <a:solidFill>
+                  <a:srgbClr val="000000"/>
+                </a:solidFill>
+                <a:effectLst/>
+                <a:latin typeface="Courier New" panose="02070309020205020404" pitchFamily="49" charset="0"/>
+              </a:rPr>
+            </a:br>
+            <a:r>
+              <a:rPr lang="en-GB" sz="1100" b="0" i="0" u="none" strike="noStrike" dirty="0">
+                <a:solidFill>
+                  <a:srgbClr val="000000"/>
+                </a:solidFill>
+                <a:effectLst/>
+                <a:latin typeface="Courier New" panose="02070309020205020404" pitchFamily="49" charset="0"/>
+              </a:rPr>
+              <a:t>x =  Conv2D(</a:t>
+            </a:r>
+            <a:r>
+              <a:rPr lang="en-GB" sz="1100" b="0" i="0" u="none" strike="noStrike" dirty="0">
+                <a:solidFill>
+                  <a:srgbClr val="09885A"/>
+                </a:solidFill>
+                <a:effectLst/>
+                <a:latin typeface="Courier New" panose="02070309020205020404" pitchFamily="49" charset="0"/>
+              </a:rPr>
+              <a:t>32</a:t>
+            </a:r>
+            <a:r>
+              <a:rPr lang="en-GB" sz="1100" b="0" i="0" u="none" strike="noStrike" dirty="0">
+                <a:solidFill>
+                  <a:srgbClr val="000000"/>
+                </a:solidFill>
+                <a:effectLst/>
+                <a:latin typeface="Courier New" panose="02070309020205020404" pitchFamily="49" charset="0"/>
+              </a:rPr>
+              <a:t>, (</a:t>
+            </a:r>
+            <a:r>
+              <a:rPr lang="en-GB" sz="1100" b="0" i="0" u="none" strike="noStrike" dirty="0">
+                <a:solidFill>
+                  <a:srgbClr val="09885A"/>
+                </a:solidFill>
+                <a:effectLst/>
+                <a:latin typeface="Courier New" panose="02070309020205020404" pitchFamily="49" charset="0"/>
+              </a:rPr>
+              <a:t>3</a:t>
+            </a:r>
+            <a:r>
+              <a:rPr lang="en-GB" sz="1100" b="0" i="0" u="none" strike="noStrike" dirty="0">
+                <a:solidFill>
+                  <a:srgbClr val="000000"/>
+                </a:solidFill>
+                <a:effectLst/>
+                <a:latin typeface="Courier New" panose="02070309020205020404" pitchFamily="49" charset="0"/>
+              </a:rPr>
+              <a:t>, </a:t>
+            </a:r>
+            <a:r>
+              <a:rPr lang="en-GB" sz="1100" b="0" i="0" u="none" strike="noStrike" dirty="0">
+                <a:solidFill>
+                  <a:srgbClr val="09885A"/>
+                </a:solidFill>
+                <a:effectLst/>
+                <a:latin typeface="Courier New" panose="02070309020205020404" pitchFamily="49" charset="0"/>
+              </a:rPr>
+              <a:t>3</a:t>
+            </a:r>
+            <a:r>
+              <a:rPr lang="en-GB" sz="1100" b="0" i="0" u="none" strike="noStrike" dirty="0">
+                <a:solidFill>
+                  <a:srgbClr val="000000"/>
+                </a:solidFill>
+                <a:effectLst/>
+                <a:latin typeface="Courier New" panose="02070309020205020404" pitchFamily="49" charset="0"/>
+              </a:rPr>
+              <a:t>), activation=</a:t>
+            </a:r>
+            <a:r>
+              <a:rPr lang="en-GB" sz="1100" b="0" i="0" u="none" strike="noStrike" dirty="0">
+                <a:solidFill>
+                  <a:srgbClr val="A31515"/>
+                </a:solidFill>
+                <a:effectLst/>
+                <a:latin typeface="Courier New" panose="02070309020205020404" pitchFamily="49" charset="0"/>
+              </a:rPr>
+              <a:t>'</a:t>
+            </a:r>
+            <a:r>
+              <a:rPr lang="en-GB" sz="1100" b="0" i="0" u="none" strike="noStrike" dirty="0" err="1">
+                <a:solidFill>
+                  <a:srgbClr val="A31515"/>
+                </a:solidFill>
+                <a:effectLst/>
+                <a:latin typeface="Courier New" panose="02070309020205020404" pitchFamily="49" charset="0"/>
+              </a:rPr>
+              <a:t>relu</a:t>
+            </a:r>
+            <a:r>
+              <a:rPr lang="en-GB" sz="1100" b="0" i="0" u="none" strike="noStrike" dirty="0">
+                <a:solidFill>
+                  <a:srgbClr val="A31515"/>
+                </a:solidFill>
+                <a:effectLst/>
+                <a:latin typeface="Courier New" panose="02070309020205020404" pitchFamily="49" charset="0"/>
+              </a:rPr>
+              <a:t>'</a:t>
+            </a:r>
+            <a:r>
+              <a:rPr lang="en-GB" sz="1100" b="0" i="0" u="none" strike="noStrike" dirty="0">
+                <a:solidFill>
+                  <a:srgbClr val="000000"/>
+                </a:solidFill>
+                <a:effectLst/>
+                <a:latin typeface="Courier New" panose="02070309020205020404" pitchFamily="49" charset="0"/>
+              </a:rPr>
+              <a:t>, padding=</a:t>
+            </a:r>
+            <a:r>
+              <a:rPr lang="en-GB" sz="1100" b="0" i="0" u="none" strike="noStrike" dirty="0">
+                <a:solidFill>
+                  <a:srgbClr val="A31515"/>
+                </a:solidFill>
+                <a:effectLst/>
+                <a:latin typeface="Courier New" panose="02070309020205020404" pitchFamily="49" charset="0"/>
+              </a:rPr>
+              <a:t>'same'</a:t>
+            </a:r>
+            <a:r>
+              <a:rPr lang="en-GB" sz="1100" b="0" i="0" u="none" strike="noStrike" dirty="0">
+                <a:solidFill>
+                  <a:srgbClr val="000000"/>
+                </a:solidFill>
+                <a:effectLst/>
+                <a:latin typeface="Courier New" panose="02070309020205020404" pitchFamily="49" charset="0"/>
+              </a:rPr>
+              <a:t>)(x)</a:t>
+            </a:r>
+          </a:p>
+          <a:p>
+            <a:r>
+              <a:rPr lang="en-GB" sz="1100" b="0" i="0" u="none" strike="noStrike" dirty="0">
+                <a:solidFill>
+                  <a:srgbClr val="000000"/>
+                </a:solidFill>
+                <a:effectLst/>
+                <a:latin typeface="Courier New" panose="02070309020205020404" pitchFamily="49" charset="0"/>
+              </a:rPr>
+              <a:t>x = UpSampling2D((</a:t>
+            </a:r>
+            <a:r>
+              <a:rPr lang="en-GB" sz="1100" b="0" i="0" u="none" strike="noStrike" dirty="0">
+                <a:solidFill>
+                  <a:srgbClr val="09885A"/>
+                </a:solidFill>
+                <a:effectLst/>
+                <a:latin typeface="Courier New" panose="02070309020205020404" pitchFamily="49" charset="0"/>
+              </a:rPr>
+              <a:t>2</a:t>
+            </a:r>
+            <a:r>
+              <a:rPr lang="en-GB" sz="1100" b="0" i="0" u="none" strike="noStrike" dirty="0">
+                <a:solidFill>
+                  <a:srgbClr val="000000"/>
+                </a:solidFill>
+                <a:effectLst/>
+                <a:latin typeface="Courier New" panose="02070309020205020404" pitchFamily="49" charset="0"/>
+              </a:rPr>
+              <a:t>, </a:t>
+            </a:r>
+            <a:r>
+              <a:rPr lang="en-GB" sz="1100" b="0" i="0" u="none" strike="noStrike" dirty="0">
+                <a:solidFill>
+                  <a:srgbClr val="09885A"/>
+                </a:solidFill>
+                <a:effectLst/>
+                <a:latin typeface="Courier New" panose="02070309020205020404" pitchFamily="49" charset="0"/>
+              </a:rPr>
+              <a:t>2</a:t>
+            </a:r>
+            <a:r>
+              <a:rPr lang="en-GB" sz="1100" b="0" i="0" u="none" strike="noStrike" dirty="0">
+                <a:solidFill>
+                  <a:srgbClr val="000000"/>
+                </a:solidFill>
+                <a:effectLst/>
+                <a:latin typeface="Courier New" panose="02070309020205020404" pitchFamily="49" charset="0"/>
+              </a:rPr>
+              <a:t>))(x)</a:t>
+            </a:r>
+          </a:p>
+          <a:p>
+            <a:r>
+              <a:rPr lang="en-GB" sz="1100" b="0" i="0" u="none" strike="noStrike" dirty="0">
+                <a:solidFill>
+                  <a:srgbClr val="000000"/>
+                </a:solidFill>
+                <a:effectLst/>
+                <a:latin typeface="Courier New" panose="02070309020205020404" pitchFamily="49" charset="0"/>
+              </a:rPr>
+              <a:t>x =  Conv2D(</a:t>
+            </a:r>
+            <a:r>
+              <a:rPr lang="en-GB" sz="1100" b="0" i="0" u="none" strike="noStrike" dirty="0">
+                <a:solidFill>
+                  <a:srgbClr val="09885A"/>
+                </a:solidFill>
+                <a:effectLst/>
+                <a:latin typeface="Courier New" panose="02070309020205020404" pitchFamily="49" charset="0"/>
+              </a:rPr>
+              <a:t>64</a:t>
+            </a:r>
+            <a:r>
+              <a:rPr lang="en-GB" sz="1100" b="0" i="0" u="none" strike="noStrike" dirty="0">
+                <a:solidFill>
+                  <a:srgbClr val="000000"/>
+                </a:solidFill>
+                <a:effectLst/>
+                <a:latin typeface="Courier New" panose="02070309020205020404" pitchFamily="49" charset="0"/>
+              </a:rPr>
+              <a:t>, (</a:t>
+            </a:r>
+            <a:r>
+              <a:rPr lang="en-GB" sz="1100" b="0" i="0" u="none" strike="noStrike" dirty="0">
+                <a:solidFill>
+                  <a:srgbClr val="09885A"/>
+                </a:solidFill>
+                <a:effectLst/>
+                <a:latin typeface="Courier New" panose="02070309020205020404" pitchFamily="49" charset="0"/>
+              </a:rPr>
+              <a:t>5</a:t>
+            </a:r>
+            <a:r>
+              <a:rPr lang="en-GB" sz="1100" b="0" i="0" u="none" strike="noStrike" dirty="0">
+                <a:solidFill>
+                  <a:srgbClr val="000000"/>
+                </a:solidFill>
+                <a:effectLst/>
+                <a:latin typeface="Courier New" panose="02070309020205020404" pitchFamily="49" charset="0"/>
+              </a:rPr>
+              <a:t>, </a:t>
+            </a:r>
+            <a:r>
+              <a:rPr lang="en-GB" sz="1100" b="0" i="0" u="none" strike="noStrike" dirty="0">
+                <a:solidFill>
+                  <a:srgbClr val="09885A"/>
+                </a:solidFill>
+                <a:effectLst/>
+                <a:latin typeface="Courier New" panose="02070309020205020404" pitchFamily="49" charset="0"/>
+              </a:rPr>
+              <a:t>5</a:t>
+            </a:r>
+            <a:r>
+              <a:rPr lang="en-GB" sz="1100" b="0" i="0" u="none" strike="noStrike" dirty="0">
+                <a:solidFill>
+                  <a:srgbClr val="000000"/>
+                </a:solidFill>
+                <a:effectLst/>
+                <a:latin typeface="Courier New" panose="02070309020205020404" pitchFamily="49" charset="0"/>
+              </a:rPr>
+              <a:t>), activation=</a:t>
+            </a:r>
+            <a:r>
+              <a:rPr lang="en-GB" sz="1100" b="0" i="0" u="none" strike="noStrike" dirty="0">
+                <a:solidFill>
+                  <a:srgbClr val="A31515"/>
+                </a:solidFill>
+                <a:effectLst/>
+                <a:latin typeface="Courier New" panose="02070309020205020404" pitchFamily="49" charset="0"/>
+              </a:rPr>
+              <a:t>'</a:t>
+            </a:r>
+            <a:r>
+              <a:rPr lang="en-GB" sz="1100" b="0" i="0" u="none" strike="noStrike" dirty="0" err="1">
+                <a:solidFill>
+                  <a:srgbClr val="A31515"/>
+                </a:solidFill>
+                <a:effectLst/>
+                <a:latin typeface="Courier New" panose="02070309020205020404" pitchFamily="49" charset="0"/>
+              </a:rPr>
+              <a:t>relu</a:t>
+            </a:r>
+            <a:r>
+              <a:rPr lang="en-GB" sz="1100" b="0" i="0" u="none" strike="noStrike" dirty="0">
+                <a:solidFill>
+                  <a:srgbClr val="A31515"/>
+                </a:solidFill>
+                <a:effectLst/>
+                <a:latin typeface="Courier New" panose="02070309020205020404" pitchFamily="49" charset="0"/>
+              </a:rPr>
+              <a:t>'</a:t>
+            </a:r>
+            <a:r>
+              <a:rPr lang="en-GB" sz="1100" b="0" i="0" u="none" strike="noStrike" dirty="0">
+                <a:solidFill>
+                  <a:srgbClr val="000000"/>
+                </a:solidFill>
+                <a:effectLst/>
+                <a:latin typeface="Courier New" panose="02070309020205020404" pitchFamily="49" charset="0"/>
+              </a:rPr>
+              <a:t>, padding=</a:t>
+            </a:r>
+            <a:r>
+              <a:rPr lang="en-GB" sz="1100" b="0" i="0" u="none" strike="noStrike" dirty="0">
+                <a:solidFill>
+                  <a:srgbClr val="A31515"/>
+                </a:solidFill>
+                <a:effectLst/>
+                <a:latin typeface="Courier New" panose="02070309020205020404" pitchFamily="49" charset="0"/>
+              </a:rPr>
+              <a:t>'same'</a:t>
+            </a:r>
+            <a:r>
+              <a:rPr lang="en-GB" sz="1100" b="0" i="0" u="none" strike="noStrike" dirty="0">
+                <a:solidFill>
+                  <a:srgbClr val="000000"/>
+                </a:solidFill>
+                <a:effectLst/>
+                <a:latin typeface="Courier New" panose="02070309020205020404" pitchFamily="49" charset="0"/>
+              </a:rPr>
+              <a:t>)(x)</a:t>
+            </a:r>
+          </a:p>
+          <a:p>
+            <a:r>
+              <a:rPr lang="en-GB" sz="1100" b="0" i="0" u="none" strike="noStrike" dirty="0">
+                <a:solidFill>
+                  <a:srgbClr val="000000"/>
+                </a:solidFill>
+                <a:effectLst/>
+                <a:latin typeface="Courier New" panose="02070309020205020404" pitchFamily="49" charset="0"/>
+              </a:rPr>
+              <a:t>x = UpSampling2D((</a:t>
+            </a:r>
+            <a:r>
+              <a:rPr lang="en-GB" sz="1100" b="0" i="0" u="none" strike="noStrike" dirty="0">
+                <a:solidFill>
+                  <a:srgbClr val="09885A"/>
+                </a:solidFill>
+                <a:effectLst/>
+                <a:latin typeface="Courier New" panose="02070309020205020404" pitchFamily="49" charset="0"/>
+              </a:rPr>
+              <a:t>2</a:t>
+            </a:r>
+            <a:r>
+              <a:rPr lang="en-GB" sz="1100" b="0" i="0" u="none" strike="noStrike" dirty="0">
+                <a:solidFill>
+                  <a:srgbClr val="000000"/>
+                </a:solidFill>
+                <a:effectLst/>
+                <a:latin typeface="Courier New" panose="02070309020205020404" pitchFamily="49" charset="0"/>
+              </a:rPr>
+              <a:t>, </a:t>
+            </a:r>
+            <a:r>
+              <a:rPr lang="en-GB" sz="1100" b="0" i="0" u="none" strike="noStrike" dirty="0">
+                <a:solidFill>
+                  <a:srgbClr val="09885A"/>
+                </a:solidFill>
+                <a:effectLst/>
+                <a:latin typeface="Courier New" panose="02070309020205020404" pitchFamily="49" charset="0"/>
+              </a:rPr>
+              <a:t>2</a:t>
+            </a:r>
+            <a:r>
+              <a:rPr lang="en-GB" sz="1100" b="0" i="0" u="none" strike="noStrike" dirty="0">
+                <a:solidFill>
+                  <a:srgbClr val="000000"/>
+                </a:solidFill>
+                <a:effectLst/>
+                <a:latin typeface="Courier New" panose="02070309020205020404" pitchFamily="49" charset="0"/>
+              </a:rPr>
+              <a:t>))(x)</a:t>
+            </a:r>
+          </a:p>
+          <a:p>
+            <a:r>
+              <a:rPr lang="en-GB" sz="1100" b="0" i="0" u="none" strike="noStrike" dirty="0">
+                <a:solidFill>
+                  <a:srgbClr val="000000"/>
+                </a:solidFill>
+                <a:effectLst/>
+                <a:latin typeface="Courier New" panose="02070309020205020404" pitchFamily="49" charset="0"/>
+              </a:rPr>
+              <a:t>x =  Conv2D(</a:t>
+            </a:r>
+            <a:r>
+              <a:rPr lang="en-GB" sz="1100" b="0" i="0" u="none" strike="noStrike" dirty="0">
+                <a:solidFill>
+                  <a:srgbClr val="09885A"/>
+                </a:solidFill>
+                <a:effectLst/>
+                <a:latin typeface="Courier New" panose="02070309020205020404" pitchFamily="49" charset="0"/>
+              </a:rPr>
+              <a:t>128</a:t>
+            </a:r>
+            <a:r>
+              <a:rPr lang="en-GB" sz="1100" b="0" i="0" u="none" strike="noStrike" dirty="0">
+                <a:solidFill>
+                  <a:srgbClr val="000000"/>
+                </a:solidFill>
+                <a:effectLst/>
+                <a:latin typeface="Courier New" panose="02070309020205020404" pitchFamily="49" charset="0"/>
+              </a:rPr>
+              <a:t>, (</a:t>
+            </a:r>
+            <a:r>
+              <a:rPr lang="en-GB" sz="1100" b="0" i="0" u="none" strike="noStrike" dirty="0">
+                <a:solidFill>
+                  <a:srgbClr val="09885A"/>
+                </a:solidFill>
+                <a:effectLst/>
+                <a:latin typeface="Courier New" panose="02070309020205020404" pitchFamily="49" charset="0"/>
+              </a:rPr>
+              <a:t>5</a:t>
+            </a:r>
+            <a:r>
+              <a:rPr lang="en-GB" sz="1100" b="0" i="0" u="none" strike="noStrike" dirty="0">
+                <a:solidFill>
+                  <a:srgbClr val="000000"/>
+                </a:solidFill>
+                <a:effectLst/>
+                <a:latin typeface="Courier New" panose="02070309020205020404" pitchFamily="49" charset="0"/>
+              </a:rPr>
+              <a:t>, </a:t>
+            </a:r>
+            <a:r>
+              <a:rPr lang="en-GB" sz="1100" b="0" i="0" u="none" strike="noStrike" dirty="0">
+                <a:solidFill>
+                  <a:srgbClr val="09885A"/>
+                </a:solidFill>
+                <a:effectLst/>
+                <a:latin typeface="Courier New" panose="02070309020205020404" pitchFamily="49" charset="0"/>
+              </a:rPr>
+              <a:t>5</a:t>
+            </a:r>
+            <a:r>
+              <a:rPr lang="en-GB" sz="1100" b="0" i="0" u="none" strike="noStrike" dirty="0">
+                <a:solidFill>
+                  <a:srgbClr val="000000"/>
+                </a:solidFill>
+                <a:effectLst/>
+                <a:latin typeface="Courier New" panose="02070309020205020404" pitchFamily="49" charset="0"/>
+              </a:rPr>
+              <a:t>), activation=</a:t>
+            </a:r>
+            <a:r>
+              <a:rPr lang="en-GB" sz="1100" b="0" i="0" u="none" strike="noStrike" dirty="0">
+                <a:solidFill>
+                  <a:srgbClr val="A31515"/>
+                </a:solidFill>
+                <a:effectLst/>
+                <a:latin typeface="Courier New" panose="02070309020205020404" pitchFamily="49" charset="0"/>
+              </a:rPr>
+              <a:t>'</a:t>
+            </a:r>
+            <a:r>
+              <a:rPr lang="en-GB" sz="1100" b="0" i="0" u="none" strike="noStrike" dirty="0" err="1">
+                <a:solidFill>
+                  <a:srgbClr val="A31515"/>
+                </a:solidFill>
+                <a:effectLst/>
+                <a:latin typeface="Courier New" panose="02070309020205020404" pitchFamily="49" charset="0"/>
+              </a:rPr>
+              <a:t>relu</a:t>
+            </a:r>
+            <a:r>
+              <a:rPr lang="en-GB" sz="1100" b="0" i="0" u="none" strike="noStrike" dirty="0">
+                <a:solidFill>
+                  <a:srgbClr val="A31515"/>
+                </a:solidFill>
+                <a:effectLst/>
+                <a:latin typeface="Courier New" panose="02070309020205020404" pitchFamily="49" charset="0"/>
+              </a:rPr>
+              <a:t>'</a:t>
+            </a:r>
+            <a:r>
+              <a:rPr lang="en-GB" sz="1100" b="0" i="0" u="none" strike="noStrike" dirty="0">
+                <a:solidFill>
+                  <a:srgbClr val="000000"/>
+                </a:solidFill>
+                <a:effectLst/>
+                <a:latin typeface="Courier New" panose="02070309020205020404" pitchFamily="49" charset="0"/>
+              </a:rPr>
+              <a:t>, padding=</a:t>
+            </a:r>
+            <a:r>
+              <a:rPr lang="en-GB" sz="1100" b="0" i="0" u="none" strike="noStrike" dirty="0">
+                <a:solidFill>
+                  <a:srgbClr val="A31515"/>
+                </a:solidFill>
+                <a:effectLst/>
+                <a:latin typeface="Courier New" panose="02070309020205020404" pitchFamily="49" charset="0"/>
+              </a:rPr>
+              <a:t>'same'</a:t>
+            </a:r>
+            <a:r>
+              <a:rPr lang="en-GB" sz="1100" b="0" i="0" u="none" strike="noStrike" dirty="0">
+                <a:solidFill>
+                  <a:srgbClr val="000000"/>
+                </a:solidFill>
+                <a:effectLst/>
+                <a:latin typeface="Courier New" panose="02070309020205020404" pitchFamily="49" charset="0"/>
+              </a:rPr>
+              <a:t>)(x)</a:t>
+            </a:r>
+          </a:p>
+          <a:p>
+            <a:r>
+              <a:rPr lang="en-GB" sz="1100" b="0" i="0" u="none" strike="noStrike" dirty="0">
+                <a:solidFill>
+                  <a:srgbClr val="008000"/>
+                </a:solidFill>
+                <a:effectLst/>
+                <a:latin typeface="Courier New" panose="02070309020205020404" pitchFamily="49" charset="0"/>
+              </a:rPr>
+              <a:t># this will help going back the original image dimensions</a:t>
+            </a:r>
+            <a:endParaRPr lang="en-GB" sz="1100" b="0" i="0" u="none" strike="noStrike" dirty="0">
+              <a:solidFill>
+                <a:srgbClr val="000000"/>
+              </a:solidFill>
+              <a:effectLst/>
+              <a:latin typeface="Courier New" panose="02070309020205020404" pitchFamily="49" charset="0"/>
+            </a:endParaRPr>
+          </a:p>
+          <a:p>
+            <a:r>
+              <a:rPr lang="en-GB" sz="1100" b="0" i="0" u="none" strike="noStrike" dirty="0">
+                <a:solidFill>
+                  <a:srgbClr val="000000"/>
+                </a:solidFill>
+                <a:effectLst/>
+                <a:latin typeface="Courier New" panose="02070309020205020404" pitchFamily="49" charset="0"/>
+              </a:rPr>
+              <a:t>x = UpSampling2D((</a:t>
+            </a:r>
+            <a:r>
+              <a:rPr lang="en-GB" sz="1100" b="0" i="0" u="none" strike="noStrike" dirty="0">
+                <a:solidFill>
+                  <a:srgbClr val="09885A"/>
+                </a:solidFill>
+                <a:effectLst/>
+                <a:latin typeface="Courier New" panose="02070309020205020404" pitchFamily="49" charset="0"/>
+              </a:rPr>
+              <a:t>2</a:t>
+            </a:r>
+            <a:r>
+              <a:rPr lang="en-GB" sz="1100" b="0" i="0" u="none" strike="noStrike" dirty="0">
+                <a:solidFill>
+                  <a:srgbClr val="000000"/>
+                </a:solidFill>
+                <a:effectLst/>
+                <a:latin typeface="Courier New" panose="02070309020205020404" pitchFamily="49" charset="0"/>
+              </a:rPr>
+              <a:t>, </a:t>
+            </a:r>
+            <a:r>
+              <a:rPr lang="en-GB" sz="1100" b="0" i="0" u="none" strike="noStrike" dirty="0">
+                <a:solidFill>
+                  <a:srgbClr val="09885A"/>
+                </a:solidFill>
+                <a:effectLst/>
+                <a:latin typeface="Courier New" panose="02070309020205020404" pitchFamily="49" charset="0"/>
+              </a:rPr>
+              <a:t>2</a:t>
+            </a:r>
+            <a:r>
+              <a:rPr lang="en-GB" sz="1100" b="0" i="0" u="none" strike="noStrike" dirty="0">
+                <a:solidFill>
+                  <a:srgbClr val="000000"/>
+                </a:solidFill>
+                <a:effectLst/>
+                <a:latin typeface="Courier New" panose="02070309020205020404" pitchFamily="49" charset="0"/>
+              </a:rPr>
+              <a:t>))(x)</a:t>
+            </a:r>
+          </a:p>
+          <a:p>
+            <a:br>
+              <a:rPr lang="en-GB" sz="1100" b="0" i="0" u="none" strike="noStrike" dirty="0">
+                <a:solidFill>
+                  <a:srgbClr val="000000"/>
+                </a:solidFill>
+                <a:effectLst/>
+                <a:latin typeface="Courier New" panose="02070309020205020404" pitchFamily="49" charset="0"/>
+              </a:rPr>
+            </a:br>
+            <a:r>
+              <a:rPr lang="en-GB" sz="1100" b="0" i="0" u="none" strike="noStrike" dirty="0">
+                <a:solidFill>
+                  <a:srgbClr val="000000"/>
+                </a:solidFill>
+                <a:effectLst/>
+                <a:latin typeface="Courier New" panose="02070309020205020404" pitchFamily="49" charset="0"/>
+              </a:rPr>
+              <a:t>decoded = Conv2D(</a:t>
+            </a:r>
+            <a:r>
+              <a:rPr lang="en-GB" sz="1100" b="0" i="0" u="none" strike="noStrike" dirty="0">
+                <a:solidFill>
+                  <a:srgbClr val="09885A"/>
+                </a:solidFill>
+                <a:effectLst/>
+                <a:latin typeface="Courier New" panose="02070309020205020404" pitchFamily="49" charset="0"/>
+              </a:rPr>
+              <a:t>1</a:t>
+            </a:r>
+            <a:r>
+              <a:rPr lang="en-GB" sz="1100" b="0" i="0" u="none" strike="noStrike" dirty="0">
+                <a:solidFill>
+                  <a:srgbClr val="000000"/>
+                </a:solidFill>
+                <a:effectLst/>
+                <a:latin typeface="Courier New" panose="02070309020205020404" pitchFamily="49" charset="0"/>
+              </a:rPr>
+              <a:t>, (</a:t>
+            </a:r>
+            <a:r>
+              <a:rPr lang="en-GB" sz="1100" b="0" i="0" u="none" strike="noStrike" dirty="0">
+                <a:solidFill>
+                  <a:srgbClr val="09885A"/>
+                </a:solidFill>
+                <a:effectLst/>
+                <a:latin typeface="Courier New" panose="02070309020205020404" pitchFamily="49" charset="0"/>
+              </a:rPr>
+              <a:t>3</a:t>
+            </a:r>
+            <a:r>
+              <a:rPr lang="en-GB" sz="1100" b="0" i="0" u="none" strike="noStrike" dirty="0">
+                <a:solidFill>
+                  <a:srgbClr val="000000"/>
+                </a:solidFill>
+                <a:effectLst/>
+                <a:latin typeface="Courier New" panose="02070309020205020404" pitchFamily="49" charset="0"/>
+              </a:rPr>
+              <a:t>, </a:t>
+            </a:r>
+            <a:r>
+              <a:rPr lang="en-GB" sz="1100" b="0" i="0" u="none" strike="noStrike" dirty="0">
+                <a:solidFill>
+                  <a:srgbClr val="09885A"/>
+                </a:solidFill>
+                <a:effectLst/>
+                <a:latin typeface="Courier New" panose="02070309020205020404" pitchFamily="49" charset="0"/>
+              </a:rPr>
+              <a:t>3</a:t>
+            </a:r>
+            <a:r>
+              <a:rPr lang="en-GB" sz="1100" b="0" i="0" u="none" strike="noStrike" dirty="0">
+                <a:solidFill>
+                  <a:srgbClr val="000000"/>
+                </a:solidFill>
+                <a:effectLst/>
+                <a:latin typeface="Courier New" panose="02070309020205020404" pitchFamily="49" charset="0"/>
+              </a:rPr>
+              <a:t>), padding=</a:t>
+            </a:r>
+            <a:r>
+              <a:rPr lang="en-GB" sz="1100" b="0" i="0" u="none" strike="noStrike" dirty="0">
+                <a:solidFill>
+                  <a:srgbClr val="A31515"/>
+                </a:solidFill>
+                <a:effectLst/>
+                <a:latin typeface="Courier New" panose="02070309020205020404" pitchFamily="49" charset="0"/>
+              </a:rPr>
+              <a:t>'same'</a:t>
+            </a:r>
+            <a:r>
+              <a:rPr lang="en-GB" sz="1100" b="0" i="0" u="none" strike="noStrike" dirty="0">
+                <a:solidFill>
+                  <a:srgbClr val="000000"/>
+                </a:solidFill>
+                <a:effectLst/>
+                <a:latin typeface="Courier New" panose="02070309020205020404" pitchFamily="49" charset="0"/>
+              </a:rPr>
+              <a:t>)(x)</a:t>
+            </a:r>
+          </a:p>
+        </p:txBody>
+      </p:sp>
+    </p:spTree>
+    <p:extLst>
+      <p:ext uri="{BB962C8B-B14F-4D97-AF65-F5344CB8AC3E}">
+        <p14:creationId xmlns:p14="http://schemas.microsoft.com/office/powerpoint/2010/main" val="1315180226"/>
+      </p:ext>
+    </p:extLst>
+  </p:cSld>
+  <p:clrMapOvr>
+    <a:masterClrMapping/>
+  </p:clrMapOvr>
+</p:sld>
+</file>
+
+<file path=ppt/slides/slide9.xml><?xml version="1.0" encoding="utf-8"?>
+<p:sld xmlns:a="http://schemas.openxmlformats.org/drawingml/2006/main" xmlns:r="http://schemas.openxmlformats.org/officeDocument/2006/relationships" xmlns:p="http://schemas.openxmlformats.org/presentationml/2006/main">
+  <p:cSld>
+    <p:spTree>
+      <p:nvGrpSpPr>
+        <p:cNvPr id="1" name=""/>
+        <p:cNvGrpSpPr/>
+        <p:nvPr/>
+      </p:nvGrpSpPr>
+      <p:grpSpPr>
+        <a:xfrm>
+          <a:off x="0" y="0"/>
+          <a:ext cx="0" cy="0"/>
+          <a:chOff x="0" y="0"/>
+          <a:chExt cx="0" cy="0"/>
+        </a:xfrm>
+      </p:grpSpPr>
+      <p:sp>
+        <p:nvSpPr>
+          <p:cNvPr id="2" name="Title 1">
+            <a:extLst>
+              <a:ext uri="{FF2B5EF4-FFF2-40B4-BE49-F238E27FC236}">
+                <a16:creationId xmlns:a16="http://schemas.microsoft.com/office/drawing/2014/main" id="{77A9E279-5BF8-824D-9707-8B1FAF62C7A2}"/>
               </a:ext>
             </a:extLst>
           </p:cNvPr>
@@ -8894,7 +11587,7 @@
             <a:spLocks noGrp="1"/>
           </p:cNvSpPr>
           <p:nvPr>
-            <p:ph idx="1"/>
+            <p:ph type="title"/>
           </p:nvPr>
         </p:nvSpPr>
         <p:spPr/>
@@ -8904,24 +11597,1461 @@
           <a:p>
             <a:r>
               <a:rPr lang="en-GB" dirty="0"/>
-              <a:t>Loss tends to not go lower than 0.0315</a:t>
-            </a:r>
-          </a:p>
+              <a:t>After image </a:t>
+            </a:r>
+            <a:r>
+              <a:rPr lang="en-GB" dirty="0" err="1"/>
+              <a:t>preprocessing</a:t>
+            </a:r>
+            <a:endParaRPr lang="en-GB" dirty="0"/>
+          </a:p>
+        </p:txBody>
+      </p:sp>
+      <p:pic>
+        <p:nvPicPr>
+          <p:cNvPr id="4" name="Content Placeholder 3">
+            <a:extLst>
+              <a:ext uri="{FF2B5EF4-FFF2-40B4-BE49-F238E27FC236}">
+                <a16:creationId xmlns:a16="http://schemas.microsoft.com/office/drawing/2014/main" id="{A46EAD10-1BE7-1848-9B30-446F6A3EAD7B}"/>
+              </a:ext>
+            </a:extLst>
+          </p:cNvPr>
+          <p:cNvPicPr>
+            <a:picLocks noGrp="1" noChangeAspect="1"/>
+          </p:cNvPicPr>
+          <p:nvPr>
+            <p:ph idx="1"/>
+          </p:nvPr>
+        </p:nvPicPr>
+        <p:blipFill>
+          <a:blip r:embed="rId2"/>
+          <a:stretch>
+            <a:fillRect/>
+          </a:stretch>
+        </p:blipFill>
+        <p:spPr>
+          <a:xfrm>
+            <a:off x="557372" y="1879413"/>
+            <a:ext cx="2184268" cy="4351338"/>
+          </a:xfrm>
+          <a:prstGeom prst="rect">
+            <a:avLst/>
+          </a:prstGeom>
+        </p:spPr>
+      </p:pic>
+      <p:sp>
+        <p:nvSpPr>
+          <p:cNvPr id="5" name="TextBox 4">
+            <a:extLst>
+              <a:ext uri="{FF2B5EF4-FFF2-40B4-BE49-F238E27FC236}">
+                <a16:creationId xmlns:a16="http://schemas.microsoft.com/office/drawing/2014/main" id="{3CB9F240-A035-F14B-AE31-3E741AE6F492}"/>
+              </a:ext>
+            </a:extLst>
+          </p:cNvPr>
+          <p:cNvSpPr txBox="1"/>
+          <p:nvPr/>
+        </p:nvSpPr>
+        <p:spPr>
+          <a:xfrm>
+            <a:off x="838200" y="1285497"/>
+            <a:ext cx="3733800" cy="369332"/>
+          </a:xfrm>
+          <a:prstGeom prst="rect">
+            <a:avLst/>
+          </a:prstGeom>
+          <a:noFill/>
+        </p:spPr>
+        <p:txBody>
+          <a:bodyPr wrap="square" rtlCol="0">
+            <a:spAutoFit/>
+          </a:bodyPr>
+          <a:lstStyle/>
           <a:p>
             <a:r>
               <a:rPr lang="en-GB" dirty="0"/>
-              <a:t>Activation stabilises loss</a:t>
-            </a:r>
-          </a:p>
-          <a:p>
-            <a:endParaRPr lang="en-GB" dirty="0"/>
+              <a:t>Predicting validation set values</a:t>
+            </a:r>
+          </a:p>
+        </p:txBody>
+      </p:sp>
+      <p:pic>
+        <p:nvPicPr>
+          <p:cNvPr id="6" name="Picture 5">
+            <a:extLst>
+              <a:ext uri="{FF2B5EF4-FFF2-40B4-BE49-F238E27FC236}">
+                <a16:creationId xmlns:a16="http://schemas.microsoft.com/office/drawing/2014/main" id="{04E419E3-25EF-9B42-9CB0-3E9FA0D32966}"/>
+              </a:ext>
+            </a:extLst>
+          </p:cNvPr>
+          <p:cNvPicPr>
+            <a:picLocks noChangeAspect="1"/>
+          </p:cNvPicPr>
+          <p:nvPr/>
+        </p:nvPicPr>
+        <p:blipFill>
+          <a:blip r:embed="rId3"/>
+          <a:stretch>
+            <a:fillRect/>
+          </a:stretch>
+        </p:blipFill>
+        <p:spPr>
+          <a:xfrm>
+            <a:off x="2868333" y="2027982"/>
+            <a:ext cx="2067320" cy="4054199"/>
+          </a:xfrm>
+          <a:prstGeom prst="rect">
+            <a:avLst/>
+          </a:prstGeom>
+        </p:spPr>
+      </p:pic>
+      <p:sp>
+        <p:nvSpPr>
+          <p:cNvPr id="7" name="Rectangle 6">
+            <a:extLst>
+              <a:ext uri="{FF2B5EF4-FFF2-40B4-BE49-F238E27FC236}">
+                <a16:creationId xmlns:a16="http://schemas.microsoft.com/office/drawing/2014/main" id="{D0F16123-C439-F84C-9049-F44EB64A8BCC}"/>
+              </a:ext>
+            </a:extLst>
+          </p:cNvPr>
+          <p:cNvSpPr/>
+          <p:nvPr/>
+        </p:nvSpPr>
+        <p:spPr>
+          <a:xfrm>
+            <a:off x="5257800" y="2952903"/>
+            <a:ext cx="6096000" cy="2800767"/>
+          </a:xfrm>
+          <a:prstGeom prst="rect">
+            <a:avLst/>
+          </a:prstGeom>
+        </p:spPr>
+        <p:txBody>
+          <a:bodyPr>
+            <a:spAutoFit/>
+          </a:bodyPr>
+          <a:lstStyle/>
+          <a:p>
+            <a:r>
+              <a:rPr lang="en-GB" sz="1100" b="0" i="0" u="none" strike="noStrike" dirty="0">
+                <a:solidFill>
+                  <a:srgbClr val="000000"/>
+                </a:solidFill>
+                <a:effectLst/>
+                <a:latin typeface="Courier New" panose="02070309020205020404" pitchFamily="49" charset="0"/>
+              </a:rPr>
+              <a:t>x =  Conv2D(</a:t>
+            </a:r>
+            <a:r>
+              <a:rPr lang="en-GB" sz="1100" b="0" i="0" u="none" strike="noStrike" dirty="0">
+                <a:solidFill>
+                  <a:srgbClr val="09885A"/>
+                </a:solidFill>
+                <a:effectLst/>
+                <a:latin typeface="Courier New" panose="02070309020205020404" pitchFamily="49" charset="0"/>
+              </a:rPr>
+              <a:t>32</a:t>
+            </a:r>
+            <a:r>
+              <a:rPr lang="en-GB" sz="1100" b="0" i="0" u="none" strike="noStrike" dirty="0">
+                <a:solidFill>
+                  <a:srgbClr val="000000"/>
+                </a:solidFill>
+                <a:effectLst/>
+                <a:latin typeface="Courier New" panose="02070309020205020404" pitchFamily="49" charset="0"/>
+              </a:rPr>
+              <a:t>, (</a:t>
+            </a:r>
+            <a:r>
+              <a:rPr lang="en-GB" sz="1100" b="0" i="0" u="none" strike="noStrike" dirty="0">
+                <a:solidFill>
+                  <a:srgbClr val="09885A"/>
+                </a:solidFill>
+                <a:effectLst/>
+                <a:latin typeface="Courier New" panose="02070309020205020404" pitchFamily="49" charset="0"/>
+              </a:rPr>
+              <a:t>3</a:t>
+            </a:r>
+            <a:r>
+              <a:rPr lang="en-GB" sz="1100" b="0" i="0" u="none" strike="noStrike" dirty="0">
+                <a:solidFill>
+                  <a:srgbClr val="000000"/>
+                </a:solidFill>
+                <a:effectLst/>
+                <a:latin typeface="Courier New" panose="02070309020205020404" pitchFamily="49" charset="0"/>
+              </a:rPr>
+              <a:t>, </a:t>
+            </a:r>
+            <a:r>
+              <a:rPr lang="en-GB" sz="1100" b="0" i="0" u="none" strike="noStrike" dirty="0">
+                <a:solidFill>
+                  <a:srgbClr val="09885A"/>
+                </a:solidFill>
+                <a:effectLst/>
+                <a:latin typeface="Courier New" panose="02070309020205020404" pitchFamily="49" charset="0"/>
+              </a:rPr>
+              <a:t>3</a:t>
+            </a:r>
+            <a:r>
+              <a:rPr lang="en-GB" sz="1100" b="0" i="0" u="none" strike="noStrike" dirty="0">
+                <a:solidFill>
+                  <a:srgbClr val="000000"/>
+                </a:solidFill>
+                <a:effectLst/>
+                <a:latin typeface="Courier New" panose="02070309020205020404" pitchFamily="49" charset="0"/>
+              </a:rPr>
+              <a:t>), activation=</a:t>
+            </a:r>
+            <a:r>
+              <a:rPr lang="en-GB" sz="1100" b="0" i="0" u="none" strike="noStrike" dirty="0">
+                <a:solidFill>
+                  <a:srgbClr val="A31515"/>
+                </a:solidFill>
+                <a:effectLst/>
+                <a:latin typeface="Courier New" panose="02070309020205020404" pitchFamily="49" charset="0"/>
+              </a:rPr>
+              <a:t>'</a:t>
+            </a:r>
+            <a:r>
+              <a:rPr lang="en-GB" sz="1100" b="0" i="0" u="none" strike="noStrike" dirty="0" err="1">
+                <a:solidFill>
+                  <a:srgbClr val="A31515"/>
+                </a:solidFill>
+                <a:effectLst/>
+                <a:latin typeface="Courier New" panose="02070309020205020404" pitchFamily="49" charset="0"/>
+              </a:rPr>
+              <a:t>relu</a:t>
+            </a:r>
+            <a:r>
+              <a:rPr lang="en-GB" sz="1100" b="0" i="0" u="none" strike="noStrike" dirty="0">
+                <a:solidFill>
+                  <a:srgbClr val="A31515"/>
+                </a:solidFill>
+                <a:effectLst/>
+                <a:latin typeface="Courier New" panose="02070309020205020404" pitchFamily="49" charset="0"/>
+              </a:rPr>
+              <a:t>'</a:t>
+            </a:r>
+            <a:r>
+              <a:rPr lang="en-GB" sz="1100" b="0" i="0" u="none" strike="noStrike" dirty="0">
+                <a:solidFill>
+                  <a:srgbClr val="000000"/>
+                </a:solidFill>
+                <a:effectLst/>
+                <a:latin typeface="Courier New" panose="02070309020205020404" pitchFamily="49" charset="0"/>
+              </a:rPr>
+              <a:t>, padding=</a:t>
+            </a:r>
+            <a:r>
+              <a:rPr lang="en-GB" sz="1100" b="0" i="0" u="none" strike="noStrike" dirty="0">
+                <a:solidFill>
+                  <a:srgbClr val="A31515"/>
+                </a:solidFill>
+                <a:effectLst/>
+                <a:latin typeface="Courier New" panose="02070309020205020404" pitchFamily="49" charset="0"/>
+              </a:rPr>
+              <a:t>'same'</a:t>
+            </a:r>
+            <a:r>
+              <a:rPr lang="en-GB" sz="1100" b="0" i="0" u="none" strike="noStrike" dirty="0">
+                <a:solidFill>
+                  <a:srgbClr val="000000"/>
+                </a:solidFill>
+                <a:effectLst/>
+                <a:latin typeface="Courier New" panose="02070309020205020404" pitchFamily="49" charset="0"/>
+              </a:rPr>
+              <a:t>)(</a:t>
+            </a:r>
+            <a:r>
+              <a:rPr lang="en-GB" sz="1100" b="0" i="0" u="none" strike="noStrike" dirty="0" err="1">
+                <a:solidFill>
+                  <a:srgbClr val="000000"/>
+                </a:solidFill>
+                <a:effectLst/>
+                <a:latin typeface="Courier New" panose="02070309020205020404" pitchFamily="49" charset="0"/>
+              </a:rPr>
+              <a:t>input_img</a:t>
+            </a:r>
+            <a:r>
+              <a:rPr lang="en-GB" sz="1100" b="0" i="0" u="none" strike="noStrike" dirty="0">
+                <a:solidFill>
+                  <a:srgbClr val="000000"/>
+                </a:solidFill>
+                <a:effectLst/>
+                <a:latin typeface="Courier New" panose="02070309020205020404" pitchFamily="49" charset="0"/>
+              </a:rPr>
+              <a:t>)</a:t>
+            </a:r>
+          </a:p>
+          <a:p>
+            <a:r>
+              <a:rPr lang="en-GB" sz="1100" b="0" i="0" u="none" strike="noStrike" dirty="0">
+                <a:solidFill>
+                  <a:srgbClr val="000000"/>
+                </a:solidFill>
+                <a:effectLst/>
+                <a:latin typeface="Courier New" panose="02070309020205020404" pitchFamily="49" charset="0"/>
+              </a:rPr>
+              <a:t>x = MaxPooling2D((</a:t>
+            </a:r>
+            <a:r>
+              <a:rPr lang="en-GB" sz="1100" b="0" i="0" u="none" strike="noStrike" dirty="0">
+                <a:solidFill>
+                  <a:srgbClr val="09885A"/>
+                </a:solidFill>
+                <a:effectLst/>
+                <a:latin typeface="Courier New" panose="02070309020205020404" pitchFamily="49" charset="0"/>
+              </a:rPr>
+              <a:t>2</a:t>
+            </a:r>
+            <a:r>
+              <a:rPr lang="en-GB" sz="1100" b="0" i="0" u="none" strike="noStrike" dirty="0">
+                <a:solidFill>
+                  <a:srgbClr val="000000"/>
+                </a:solidFill>
+                <a:effectLst/>
+                <a:latin typeface="Courier New" panose="02070309020205020404" pitchFamily="49" charset="0"/>
+              </a:rPr>
+              <a:t>, </a:t>
+            </a:r>
+            <a:r>
+              <a:rPr lang="en-GB" sz="1100" b="0" i="0" u="none" strike="noStrike" dirty="0">
+                <a:solidFill>
+                  <a:srgbClr val="09885A"/>
+                </a:solidFill>
+                <a:effectLst/>
+                <a:latin typeface="Courier New" panose="02070309020205020404" pitchFamily="49" charset="0"/>
+              </a:rPr>
+              <a:t>2</a:t>
+            </a:r>
+            <a:r>
+              <a:rPr lang="en-GB" sz="1100" b="0" i="0" u="none" strike="noStrike" dirty="0">
+                <a:solidFill>
+                  <a:srgbClr val="000000"/>
+                </a:solidFill>
+                <a:effectLst/>
+                <a:latin typeface="Courier New" panose="02070309020205020404" pitchFamily="49" charset="0"/>
+              </a:rPr>
+              <a:t>), padding=</a:t>
+            </a:r>
+            <a:r>
+              <a:rPr lang="en-GB" sz="1100" b="0" i="0" u="none" strike="noStrike" dirty="0">
+                <a:solidFill>
+                  <a:srgbClr val="A31515"/>
+                </a:solidFill>
+                <a:effectLst/>
+                <a:latin typeface="Courier New" panose="02070309020205020404" pitchFamily="49" charset="0"/>
+              </a:rPr>
+              <a:t>'same'</a:t>
+            </a:r>
+            <a:r>
+              <a:rPr lang="en-GB" sz="1100" b="0" i="0" u="none" strike="noStrike" dirty="0">
+                <a:solidFill>
+                  <a:srgbClr val="000000"/>
+                </a:solidFill>
+                <a:effectLst/>
+                <a:latin typeface="Courier New" panose="02070309020205020404" pitchFamily="49" charset="0"/>
+              </a:rPr>
+              <a:t>)(x)</a:t>
+            </a:r>
+          </a:p>
+          <a:p>
+            <a:r>
+              <a:rPr lang="en-GB" sz="1100" b="0" i="0" u="none" strike="noStrike" dirty="0">
+                <a:solidFill>
+                  <a:srgbClr val="000000"/>
+                </a:solidFill>
+                <a:effectLst/>
+                <a:latin typeface="Courier New" panose="02070309020205020404" pitchFamily="49" charset="0"/>
+              </a:rPr>
+              <a:t>x = Conv2D(</a:t>
+            </a:r>
+            <a:r>
+              <a:rPr lang="en-GB" sz="1100" b="0" i="0" u="none" strike="noStrike" dirty="0">
+                <a:solidFill>
+                  <a:srgbClr val="09885A"/>
+                </a:solidFill>
+                <a:effectLst/>
+                <a:latin typeface="Courier New" panose="02070309020205020404" pitchFamily="49" charset="0"/>
+              </a:rPr>
+              <a:t>16</a:t>
+            </a:r>
+            <a:r>
+              <a:rPr lang="en-GB" sz="1100" b="0" i="0" u="none" strike="noStrike" dirty="0">
+                <a:solidFill>
+                  <a:srgbClr val="000000"/>
+                </a:solidFill>
+                <a:effectLst/>
+                <a:latin typeface="Courier New" panose="02070309020205020404" pitchFamily="49" charset="0"/>
+              </a:rPr>
+              <a:t>, (</a:t>
+            </a:r>
+            <a:r>
+              <a:rPr lang="en-GB" sz="1100" b="0" i="0" u="none" strike="noStrike" dirty="0">
+                <a:solidFill>
+                  <a:srgbClr val="09885A"/>
+                </a:solidFill>
+                <a:effectLst/>
+                <a:latin typeface="Courier New" panose="02070309020205020404" pitchFamily="49" charset="0"/>
+              </a:rPr>
+              <a:t>3</a:t>
+            </a:r>
+            <a:r>
+              <a:rPr lang="en-GB" sz="1100" b="0" i="0" u="none" strike="noStrike" dirty="0">
+                <a:solidFill>
+                  <a:srgbClr val="000000"/>
+                </a:solidFill>
+                <a:effectLst/>
+                <a:latin typeface="Courier New" panose="02070309020205020404" pitchFamily="49" charset="0"/>
+              </a:rPr>
+              <a:t>, </a:t>
+            </a:r>
+            <a:r>
+              <a:rPr lang="en-GB" sz="1100" b="0" i="0" u="none" strike="noStrike" dirty="0">
+                <a:solidFill>
+                  <a:srgbClr val="09885A"/>
+                </a:solidFill>
+                <a:effectLst/>
+                <a:latin typeface="Courier New" panose="02070309020205020404" pitchFamily="49" charset="0"/>
+              </a:rPr>
+              <a:t>3</a:t>
+            </a:r>
+            <a:r>
+              <a:rPr lang="en-GB" sz="1100" b="0" i="0" u="none" strike="noStrike" dirty="0">
+                <a:solidFill>
+                  <a:srgbClr val="000000"/>
+                </a:solidFill>
+                <a:effectLst/>
+                <a:latin typeface="Courier New" panose="02070309020205020404" pitchFamily="49" charset="0"/>
+              </a:rPr>
+              <a:t>), activation=</a:t>
+            </a:r>
+            <a:r>
+              <a:rPr lang="en-GB" sz="1100" b="0" i="0" u="none" strike="noStrike" dirty="0">
+                <a:solidFill>
+                  <a:srgbClr val="A31515"/>
+                </a:solidFill>
+                <a:effectLst/>
+                <a:latin typeface="Courier New" panose="02070309020205020404" pitchFamily="49" charset="0"/>
+              </a:rPr>
+              <a:t>'</a:t>
+            </a:r>
+            <a:r>
+              <a:rPr lang="en-GB" sz="1100" b="0" i="0" u="none" strike="noStrike" dirty="0" err="1">
+                <a:solidFill>
+                  <a:srgbClr val="A31515"/>
+                </a:solidFill>
+                <a:effectLst/>
+                <a:latin typeface="Courier New" panose="02070309020205020404" pitchFamily="49" charset="0"/>
+              </a:rPr>
+              <a:t>relu</a:t>
+            </a:r>
+            <a:r>
+              <a:rPr lang="en-GB" sz="1100" b="0" i="0" u="none" strike="noStrike" dirty="0">
+                <a:solidFill>
+                  <a:srgbClr val="A31515"/>
+                </a:solidFill>
+                <a:effectLst/>
+                <a:latin typeface="Courier New" panose="02070309020205020404" pitchFamily="49" charset="0"/>
+              </a:rPr>
+              <a:t>'</a:t>
+            </a:r>
+            <a:r>
+              <a:rPr lang="en-GB" sz="1100" b="0" i="0" u="none" strike="noStrike" dirty="0">
+                <a:solidFill>
+                  <a:srgbClr val="000000"/>
+                </a:solidFill>
+                <a:effectLst/>
+                <a:latin typeface="Courier New" panose="02070309020205020404" pitchFamily="49" charset="0"/>
+              </a:rPr>
+              <a:t>, padding=</a:t>
+            </a:r>
+            <a:r>
+              <a:rPr lang="en-GB" sz="1100" b="0" i="0" u="none" strike="noStrike" dirty="0">
+                <a:solidFill>
+                  <a:srgbClr val="A31515"/>
+                </a:solidFill>
+                <a:effectLst/>
+                <a:latin typeface="Courier New" panose="02070309020205020404" pitchFamily="49" charset="0"/>
+              </a:rPr>
+              <a:t>'same'</a:t>
+            </a:r>
+            <a:r>
+              <a:rPr lang="en-GB" sz="1100" b="0" i="0" u="none" strike="noStrike" dirty="0">
+                <a:solidFill>
+                  <a:srgbClr val="000000"/>
+                </a:solidFill>
+                <a:effectLst/>
+                <a:latin typeface="Courier New" panose="02070309020205020404" pitchFamily="49" charset="0"/>
+              </a:rPr>
+              <a:t>)(x)</a:t>
+            </a:r>
+          </a:p>
+          <a:p>
+            <a:r>
+              <a:rPr lang="en-GB" sz="1100" b="0" i="0" u="none" strike="noStrike" dirty="0">
+                <a:solidFill>
+                  <a:srgbClr val="000000"/>
+                </a:solidFill>
+                <a:effectLst/>
+                <a:latin typeface="Courier New" panose="02070309020205020404" pitchFamily="49" charset="0"/>
+              </a:rPr>
+              <a:t>x = MaxPooling2D((</a:t>
+            </a:r>
+            <a:r>
+              <a:rPr lang="en-GB" sz="1100" b="0" i="0" u="none" strike="noStrike" dirty="0">
+                <a:solidFill>
+                  <a:srgbClr val="09885A"/>
+                </a:solidFill>
+                <a:effectLst/>
+                <a:latin typeface="Courier New" panose="02070309020205020404" pitchFamily="49" charset="0"/>
+              </a:rPr>
+              <a:t>2</a:t>
+            </a:r>
+            <a:r>
+              <a:rPr lang="en-GB" sz="1100" b="0" i="0" u="none" strike="noStrike" dirty="0">
+                <a:solidFill>
+                  <a:srgbClr val="000000"/>
+                </a:solidFill>
+                <a:effectLst/>
+                <a:latin typeface="Courier New" panose="02070309020205020404" pitchFamily="49" charset="0"/>
+              </a:rPr>
+              <a:t>, </a:t>
+            </a:r>
+            <a:r>
+              <a:rPr lang="en-GB" sz="1100" b="0" i="0" u="none" strike="noStrike" dirty="0">
+                <a:solidFill>
+                  <a:srgbClr val="09885A"/>
+                </a:solidFill>
+                <a:effectLst/>
+                <a:latin typeface="Courier New" panose="02070309020205020404" pitchFamily="49" charset="0"/>
+              </a:rPr>
+              <a:t>2</a:t>
+            </a:r>
+            <a:r>
+              <a:rPr lang="en-GB" sz="1100" b="0" i="0" u="none" strike="noStrike" dirty="0">
+                <a:solidFill>
+                  <a:srgbClr val="000000"/>
+                </a:solidFill>
+                <a:effectLst/>
+                <a:latin typeface="Courier New" panose="02070309020205020404" pitchFamily="49" charset="0"/>
+              </a:rPr>
+              <a:t>), padding=</a:t>
+            </a:r>
+            <a:r>
+              <a:rPr lang="en-GB" sz="1100" b="0" i="0" u="none" strike="noStrike" dirty="0">
+                <a:solidFill>
+                  <a:srgbClr val="A31515"/>
+                </a:solidFill>
+                <a:effectLst/>
+                <a:latin typeface="Courier New" panose="02070309020205020404" pitchFamily="49" charset="0"/>
+              </a:rPr>
+              <a:t>'same'</a:t>
+            </a:r>
+            <a:r>
+              <a:rPr lang="en-GB" sz="1100" b="0" i="0" u="none" strike="noStrike" dirty="0">
+                <a:solidFill>
+                  <a:srgbClr val="000000"/>
+                </a:solidFill>
+                <a:effectLst/>
+                <a:latin typeface="Courier New" panose="02070309020205020404" pitchFamily="49" charset="0"/>
+              </a:rPr>
+              <a:t>)(x)</a:t>
+            </a:r>
+          </a:p>
+          <a:p>
+            <a:r>
+              <a:rPr lang="en-GB" sz="1100" b="0" i="0" u="none" strike="noStrike" dirty="0">
+                <a:solidFill>
+                  <a:srgbClr val="000000"/>
+                </a:solidFill>
+                <a:effectLst/>
+                <a:latin typeface="Courier New" panose="02070309020205020404" pitchFamily="49" charset="0"/>
+              </a:rPr>
+              <a:t>x = Conv2D(</a:t>
+            </a:r>
+            <a:r>
+              <a:rPr lang="en-GB" sz="1100" b="0" i="0" u="none" strike="noStrike" dirty="0">
+                <a:solidFill>
+                  <a:srgbClr val="09885A"/>
+                </a:solidFill>
+                <a:effectLst/>
+                <a:latin typeface="Courier New" panose="02070309020205020404" pitchFamily="49" charset="0"/>
+              </a:rPr>
+              <a:t>16</a:t>
+            </a:r>
+            <a:r>
+              <a:rPr lang="en-GB" sz="1100" b="0" i="0" u="none" strike="noStrike" dirty="0">
+                <a:solidFill>
+                  <a:srgbClr val="000000"/>
+                </a:solidFill>
+                <a:effectLst/>
+                <a:latin typeface="Courier New" panose="02070309020205020404" pitchFamily="49" charset="0"/>
+              </a:rPr>
+              <a:t>, (</a:t>
+            </a:r>
+            <a:r>
+              <a:rPr lang="en-GB" sz="1100" b="0" i="0" u="none" strike="noStrike" dirty="0">
+                <a:solidFill>
+                  <a:srgbClr val="09885A"/>
+                </a:solidFill>
+                <a:effectLst/>
+                <a:latin typeface="Courier New" panose="02070309020205020404" pitchFamily="49" charset="0"/>
+              </a:rPr>
+              <a:t>3</a:t>
+            </a:r>
+            <a:r>
+              <a:rPr lang="en-GB" sz="1100" b="0" i="0" u="none" strike="noStrike" dirty="0">
+                <a:solidFill>
+                  <a:srgbClr val="000000"/>
+                </a:solidFill>
+                <a:effectLst/>
+                <a:latin typeface="Courier New" panose="02070309020205020404" pitchFamily="49" charset="0"/>
+              </a:rPr>
+              <a:t>, </a:t>
+            </a:r>
+            <a:r>
+              <a:rPr lang="en-GB" sz="1100" b="0" i="0" u="none" strike="noStrike" dirty="0">
+                <a:solidFill>
+                  <a:srgbClr val="09885A"/>
+                </a:solidFill>
+                <a:effectLst/>
+                <a:latin typeface="Courier New" panose="02070309020205020404" pitchFamily="49" charset="0"/>
+              </a:rPr>
+              <a:t>3</a:t>
+            </a:r>
+            <a:r>
+              <a:rPr lang="en-GB" sz="1100" b="0" i="0" u="none" strike="noStrike" dirty="0">
+                <a:solidFill>
+                  <a:srgbClr val="000000"/>
+                </a:solidFill>
+                <a:effectLst/>
+                <a:latin typeface="Courier New" panose="02070309020205020404" pitchFamily="49" charset="0"/>
+              </a:rPr>
+              <a:t>), activation=</a:t>
+            </a:r>
+            <a:r>
+              <a:rPr lang="en-GB" sz="1100" b="0" i="0" u="none" strike="noStrike" dirty="0">
+                <a:solidFill>
+                  <a:srgbClr val="A31515"/>
+                </a:solidFill>
+                <a:effectLst/>
+                <a:latin typeface="Courier New" panose="02070309020205020404" pitchFamily="49" charset="0"/>
+              </a:rPr>
+              <a:t>'</a:t>
+            </a:r>
+            <a:r>
+              <a:rPr lang="en-GB" sz="1100" b="0" i="0" u="none" strike="noStrike" dirty="0" err="1">
+                <a:solidFill>
+                  <a:srgbClr val="A31515"/>
+                </a:solidFill>
+                <a:effectLst/>
+                <a:latin typeface="Courier New" panose="02070309020205020404" pitchFamily="49" charset="0"/>
+              </a:rPr>
+              <a:t>relu</a:t>
+            </a:r>
+            <a:r>
+              <a:rPr lang="en-GB" sz="1100" b="0" i="0" u="none" strike="noStrike" dirty="0">
+                <a:solidFill>
+                  <a:srgbClr val="A31515"/>
+                </a:solidFill>
+                <a:effectLst/>
+                <a:latin typeface="Courier New" panose="02070309020205020404" pitchFamily="49" charset="0"/>
+              </a:rPr>
+              <a:t>'</a:t>
+            </a:r>
+            <a:r>
+              <a:rPr lang="en-GB" sz="1100" b="0" i="0" u="none" strike="noStrike" dirty="0">
+                <a:solidFill>
+                  <a:srgbClr val="000000"/>
+                </a:solidFill>
+                <a:effectLst/>
+                <a:latin typeface="Courier New" panose="02070309020205020404" pitchFamily="49" charset="0"/>
+              </a:rPr>
+              <a:t>, padding=</a:t>
+            </a:r>
+            <a:r>
+              <a:rPr lang="en-GB" sz="1100" b="0" i="0" u="none" strike="noStrike" dirty="0">
+                <a:solidFill>
+                  <a:srgbClr val="A31515"/>
+                </a:solidFill>
+                <a:effectLst/>
+                <a:latin typeface="Courier New" panose="02070309020205020404" pitchFamily="49" charset="0"/>
+              </a:rPr>
+              <a:t>'same'</a:t>
+            </a:r>
+            <a:r>
+              <a:rPr lang="en-GB" sz="1100" b="0" i="0" u="none" strike="noStrike" dirty="0">
+                <a:solidFill>
+                  <a:srgbClr val="000000"/>
+                </a:solidFill>
+                <a:effectLst/>
+                <a:latin typeface="Courier New" panose="02070309020205020404" pitchFamily="49" charset="0"/>
+              </a:rPr>
+              <a:t>)(x)</a:t>
+            </a:r>
+          </a:p>
+          <a:p>
+            <a:r>
+              <a:rPr lang="en-GB" sz="1100" b="0" i="0" u="none" strike="noStrike" dirty="0">
+                <a:solidFill>
+                  <a:srgbClr val="000000"/>
+                </a:solidFill>
+                <a:effectLst/>
+                <a:latin typeface="Courier New" panose="02070309020205020404" pitchFamily="49" charset="0"/>
+              </a:rPr>
+              <a:t>x = MaxPooling2D((</a:t>
+            </a:r>
+            <a:r>
+              <a:rPr lang="en-GB" sz="1100" b="0" i="0" u="none" strike="noStrike" dirty="0">
+                <a:solidFill>
+                  <a:srgbClr val="09885A"/>
+                </a:solidFill>
+                <a:effectLst/>
+                <a:latin typeface="Courier New" panose="02070309020205020404" pitchFamily="49" charset="0"/>
+              </a:rPr>
+              <a:t>2</a:t>
+            </a:r>
+            <a:r>
+              <a:rPr lang="en-GB" sz="1100" b="0" i="0" u="none" strike="noStrike" dirty="0">
+                <a:solidFill>
+                  <a:srgbClr val="000000"/>
+                </a:solidFill>
+                <a:effectLst/>
+                <a:latin typeface="Courier New" panose="02070309020205020404" pitchFamily="49" charset="0"/>
+              </a:rPr>
+              <a:t>, </a:t>
+            </a:r>
+            <a:r>
+              <a:rPr lang="en-GB" sz="1100" b="0" i="0" u="none" strike="noStrike" dirty="0">
+                <a:solidFill>
+                  <a:srgbClr val="09885A"/>
+                </a:solidFill>
+                <a:effectLst/>
+                <a:latin typeface="Courier New" panose="02070309020205020404" pitchFamily="49" charset="0"/>
+              </a:rPr>
+              <a:t>2</a:t>
+            </a:r>
+            <a:r>
+              <a:rPr lang="en-GB" sz="1100" b="0" i="0" u="none" strike="noStrike" dirty="0">
+                <a:solidFill>
+                  <a:srgbClr val="000000"/>
+                </a:solidFill>
+                <a:effectLst/>
+                <a:latin typeface="Courier New" panose="02070309020205020404" pitchFamily="49" charset="0"/>
+              </a:rPr>
+              <a:t>), padding=</a:t>
+            </a:r>
+            <a:r>
+              <a:rPr lang="en-GB" sz="1100" b="0" i="0" u="none" strike="noStrike" dirty="0">
+                <a:solidFill>
+                  <a:srgbClr val="A31515"/>
+                </a:solidFill>
+                <a:effectLst/>
+                <a:latin typeface="Courier New" panose="02070309020205020404" pitchFamily="49" charset="0"/>
+              </a:rPr>
+              <a:t>'same'</a:t>
+            </a:r>
+            <a:r>
+              <a:rPr lang="en-GB" sz="1100" b="0" i="0" u="none" strike="noStrike" dirty="0">
+                <a:solidFill>
+                  <a:srgbClr val="000000"/>
+                </a:solidFill>
+                <a:effectLst/>
+                <a:latin typeface="Courier New" panose="02070309020205020404" pitchFamily="49" charset="0"/>
+              </a:rPr>
+              <a:t>)(x)</a:t>
+            </a:r>
+          </a:p>
+          <a:p>
+            <a:r>
+              <a:rPr lang="en-GB" sz="1100" b="0" i="0" u="none" strike="noStrike" dirty="0">
+                <a:solidFill>
+                  <a:srgbClr val="000000"/>
+                </a:solidFill>
+                <a:effectLst/>
+                <a:latin typeface="Courier New" panose="02070309020205020404" pitchFamily="49" charset="0"/>
+              </a:rPr>
+              <a:t>encoded = Flatten()(x)</a:t>
+            </a:r>
+          </a:p>
+          <a:p>
+            <a:r>
+              <a:rPr lang="en-GB" sz="1100" b="0" i="0" u="none" strike="noStrike" dirty="0">
+                <a:solidFill>
+                  <a:srgbClr val="008000"/>
+                </a:solidFill>
+                <a:effectLst/>
+                <a:latin typeface="Courier New" panose="02070309020205020404" pitchFamily="49" charset="0"/>
+              </a:rPr>
+              <a:t>#encoded = x</a:t>
+            </a:r>
+            <a:endParaRPr lang="en-GB" sz="1100" b="0" i="0" u="none" strike="noStrike" dirty="0">
+              <a:solidFill>
+                <a:srgbClr val="000000"/>
+              </a:solidFill>
+              <a:effectLst/>
+              <a:latin typeface="Courier New" panose="02070309020205020404" pitchFamily="49" charset="0"/>
+            </a:endParaRPr>
+          </a:p>
+          <a:p>
+            <a:br>
+              <a:rPr lang="en-GB" sz="1100" b="0" i="0" u="none" strike="noStrike" dirty="0">
+                <a:solidFill>
+                  <a:srgbClr val="000000"/>
+                </a:solidFill>
+                <a:effectLst/>
+                <a:latin typeface="Courier New" panose="02070309020205020404" pitchFamily="49" charset="0"/>
+              </a:rPr>
+            </a:br>
+            <a:r>
+              <a:rPr lang="en-GB" sz="1100" b="0" i="0" u="none" strike="noStrike" dirty="0">
+                <a:solidFill>
+                  <a:srgbClr val="000000"/>
+                </a:solidFill>
+                <a:effectLst/>
+                <a:latin typeface="Courier New" panose="02070309020205020404" pitchFamily="49" charset="0"/>
+              </a:rPr>
+              <a:t>x =  Conv2D(</a:t>
+            </a:r>
+            <a:r>
+              <a:rPr lang="en-GB" sz="1100" b="0" i="0" u="none" strike="noStrike" dirty="0">
+                <a:solidFill>
+                  <a:srgbClr val="09885A"/>
+                </a:solidFill>
+                <a:effectLst/>
+                <a:latin typeface="Courier New" panose="02070309020205020404" pitchFamily="49" charset="0"/>
+              </a:rPr>
+              <a:t>16</a:t>
+            </a:r>
+            <a:r>
+              <a:rPr lang="en-GB" sz="1100" b="0" i="0" u="none" strike="noStrike" dirty="0">
+                <a:solidFill>
+                  <a:srgbClr val="000000"/>
+                </a:solidFill>
+                <a:effectLst/>
+                <a:latin typeface="Courier New" panose="02070309020205020404" pitchFamily="49" charset="0"/>
+              </a:rPr>
+              <a:t>, (</a:t>
+            </a:r>
+            <a:r>
+              <a:rPr lang="en-GB" sz="1100" b="0" i="0" u="none" strike="noStrike" dirty="0">
+                <a:solidFill>
+                  <a:srgbClr val="09885A"/>
+                </a:solidFill>
+                <a:effectLst/>
+                <a:latin typeface="Courier New" panose="02070309020205020404" pitchFamily="49" charset="0"/>
+              </a:rPr>
+              <a:t>3</a:t>
+            </a:r>
+            <a:r>
+              <a:rPr lang="en-GB" sz="1100" b="0" i="0" u="none" strike="noStrike" dirty="0">
+                <a:solidFill>
+                  <a:srgbClr val="000000"/>
+                </a:solidFill>
+                <a:effectLst/>
+                <a:latin typeface="Courier New" panose="02070309020205020404" pitchFamily="49" charset="0"/>
+              </a:rPr>
+              <a:t>, </a:t>
+            </a:r>
+            <a:r>
+              <a:rPr lang="en-GB" sz="1100" b="0" i="0" u="none" strike="noStrike" dirty="0">
+                <a:solidFill>
+                  <a:srgbClr val="09885A"/>
+                </a:solidFill>
+                <a:effectLst/>
+                <a:latin typeface="Courier New" panose="02070309020205020404" pitchFamily="49" charset="0"/>
+              </a:rPr>
+              <a:t>3</a:t>
+            </a:r>
+            <a:r>
+              <a:rPr lang="en-GB" sz="1100" b="0" i="0" u="none" strike="noStrike" dirty="0">
+                <a:solidFill>
+                  <a:srgbClr val="000000"/>
+                </a:solidFill>
+                <a:effectLst/>
+                <a:latin typeface="Courier New" panose="02070309020205020404" pitchFamily="49" charset="0"/>
+              </a:rPr>
+              <a:t>), activation=</a:t>
+            </a:r>
+            <a:r>
+              <a:rPr lang="en-GB" sz="1100" b="0" i="0" u="none" strike="noStrike" dirty="0">
+                <a:solidFill>
+                  <a:srgbClr val="A31515"/>
+                </a:solidFill>
+                <a:effectLst/>
+                <a:latin typeface="Courier New" panose="02070309020205020404" pitchFamily="49" charset="0"/>
+              </a:rPr>
+              <a:t>'</a:t>
+            </a:r>
+            <a:r>
+              <a:rPr lang="en-GB" sz="1100" b="0" i="0" u="none" strike="noStrike" dirty="0" err="1">
+                <a:solidFill>
+                  <a:srgbClr val="A31515"/>
+                </a:solidFill>
+                <a:effectLst/>
+                <a:latin typeface="Courier New" panose="02070309020205020404" pitchFamily="49" charset="0"/>
+              </a:rPr>
+              <a:t>relu</a:t>
+            </a:r>
+            <a:r>
+              <a:rPr lang="en-GB" sz="1100" b="0" i="0" u="none" strike="noStrike" dirty="0">
+                <a:solidFill>
+                  <a:srgbClr val="A31515"/>
+                </a:solidFill>
+                <a:effectLst/>
+                <a:latin typeface="Courier New" panose="02070309020205020404" pitchFamily="49" charset="0"/>
+              </a:rPr>
+              <a:t>'</a:t>
+            </a:r>
+            <a:r>
+              <a:rPr lang="en-GB" sz="1100" b="0" i="0" u="none" strike="noStrike" dirty="0">
+                <a:solidFill>
+                  <a:srgbClr val="000000"/>
+                </a:solidFill>
+                <a:effectLst/>
+                <a:latin typeface="Courier New" panose="02070309020205020404" pitchFamily="49" charset="0"/>
+              </a:rPr>
+              <a:t>, padding=</a:t>
+            </a:r>
+            <a:r>
+              <a:rPr lang="en-GB" sz="1100" b="0" i="0" u="none" strike="noStrike" dirty="0">
+                <a:solidFill>
+                  <a:srgbClr val="A31515"/>
+                </a:solidFill>
+                <a:effectLst/>
+                <a:latin typeface="Courier New" panose="02070309020205020404" pitchFamily="49" charset="0"/>
+              </a:rPr>
+              <a:t>'same'</a:t>
+            </a:r>
+            <a:r>
+              <a:rPr lang="en-GB" sz="1100" b="0" i="0" u="none" strike="noStrike" dirty="0">
+                <a:solidFill>
+                  <a:srgbClr val="000000"/>
+                </a:solidFill>
+                <a:effectLst/>
+                <a:latin typeface="Courier New" panose="02070309020205020404" pitchFamily="49" charset="0"/>
+              </a:rPr>
+              <a:t>)(x)</a:t>
+            </a:r>
+          </a:p>
+          <a:p>
+            <a:r>
+              <a:rPr lang="en-GB" sz="1100" b="0" i="0" u="none" strike="noStrike" dirty="0">
+                <a:solidFill>
+                  <a:srgbClr val="000000"/>
+                </a:solidFill>
+                <a:effectLst/>
+                <a:latin typeface="Courier New" panose="02070309020205020404" pitchFamily="49" charset="0"/>
+              </a:rPr>
+              <a:t>x = UpSampling2D((</a:t>
+            </a:r>
+            <a:r>
+              <a:rPr lang="en-GB" sz="1100" b="0" i="0" u="none" strike="noStrike" dirty="0">
+                <a:solidFill>
+                  <a:srgbClr val="09885A"/>
+                </a:solidFill>
+                <a:effectLst/>
+                <a:latin typeface="Courier New" panose="02070309020205020404" pitchFamily="49" charset="0"/>
+              </a:rPr>
+              <a:t>2</a:t>
+            </a:r>
+            <a:r>
+              <a:rPr lang="en-GB" sz="1100" b="0" i="0" u="none" strike="noStrike" dirty="0">
+                <a:solidFill>
+                  <a:srgbClr val="000000"/>
+                </a:solidFill>
+                <a:effectLst/>
+                <a:latin typeface="Courier New" panose="02070309020205020404" pitchFamily="49" charset="0"/>
+              </a:rPr>
+              <a:t>, </a:t>
+            </a:r>
+            <a:r>
+              <a:rPr lang="en-GB" sz="1100" b="0" i="0" u="none" strike="noStrike" dirty="0">
+                <a:solidFill>
+                  <a:srgbClr val="09885A"/>
+                </a:solidFill>
+                <a:effectLst/>
+                <a:latin typeface="Courier New" panose="02070309020205020404" pitchFamily="49" charset="0"/>
+              </a:rPr>
+              <a:t>2</a:t>
+            </a:r>
+            <a:r>
+              <a:rPr lang="en-GB" sz="1100" b="0" i="0" u="none" strike="noStrike" dirty="0">
+                <a:solidFill>
+                  <a:srgbClr val="000000"/>
+                </a:solidFill>
+                <a:effectLst/>
+                <a:latin typeface="Courier New" panose="02070309020205020404" pitchFamily="49" charset="0"/>
+              </a:rPr>
+              <a:t>))(x)</a:t>
+            </a:r>
+          </a:p>
+          <a:p>
+            <a:r>
+              <a:rPr lang="en-GB" sz="1100" b="0" i="0" u="none" strike="noStrike" dirty="0">
+                <a:solidFill>
+                  <a:srgbClr val="000000"/>
+                </a:solidFill>
+                <a:effectLst/>
+                <a:latin typeface="Courier New" panose="02070309020205020404" pitchFamily="49" charset="0"/>
+              </a:rPr>
+              <a:t>x =  Conv2D(</a:t>
+            </a:r>
+            <a:r>
+              <a:rPr lang="en-GB" sz="1100" b="0" i="0" u="none" strike="noStrike" dirty="0">
+                <a:solidFill>
+                  <a:srgbClr val="09885A"/>
+                </a:solidFill>
+                <a:effectLst/>
+                <a:latin typeface="Courier New" panose="02070309020205020404" pitchFamily="49" charset="0"/>
+              </a:rPr>
+              <a:t>16</a:t>
+            </a:r>
+            <a:r>
+              <a:rPr lang="en-GB" sz="1100" b="0" i="0" u="none" strike="noStrike" dirty="0">
+                <a:solidFill>
+                  <a:srgbClr val="000000"/>
+                </a:solidFill>
+                <a:effectLst/>
+                <a:latin typeface="Courier New" panose="02070309020205020404" pitchFamily="49" charset="0"/>
+              </a:rPr>
+              <a:t>, (</a:t>
+            </a:r>
+            <a:r>
+              <a:rPr lang="en-GB" sz="1100" b="0" i="0" u="none" strike="noStrike" dirty="0">
+                <a:solidFill>
+                  <a:srgbClr val="09885A"/>
+                </a:solidFill>
+                <a:effectLst/>
+                <a:latin typeface="Courier New" panose="02070309020205020404" pitchFamily="49" charset="0"/>
+              </a:rPr>
+              <a:t>3</a:t>
+            </a:r>
+            <a:r>
+              <a:rPr lang="en-GB" sz="1100" b="0" i="0" u="none" strike="noStrike" dirty="0">
+                <a:solidFill>
+                  <a:srgbClr val="000000"/>
+                </a:solidFill>
+                <a:effectLst/>
+                <a:latin typeface="Courier New" panose="02070309020205020404" pitchFamily="49" charset="0"/>
+              </a:rPr>
+              <a:t>, </a:t>
+            </a:r>
+            <a:r>
+              <a:rPr lang="en-GB" sz="1100" b="0" i="0" u="none" strike="noStrike" dirty="0">
+                <a:solidFill>
+                  <a:srgbClr val="09885A"/>
+                </a:solidFill>
+                <a:effectLst/>
+                <a:latin typeface="Courier New" panose="02070309020205020404" pitchFamily="49" charset="0"/>
+              </a:rPr>
+              <a:t>3</a:t>
+            </a:r>
+            <a:r>
+              <a:rPr lang="en-GB" sz="1100" b="0" i="0" u="none" strike="noStrike" dirty="0">
+                <a:solidFill>
+                  <a:srgbClr val="000000"/>
+                </a:solidFill>
+                <a:effectLst/>
+                <a:latin typeface="Courier New" panose="02070309020205020404" pitchFamily="49" charset="0"/>
+              </a:rPr>
+              <a:t>), activation=</a:t>
+            </a:r>
+            <a:r>
+              <a:rPr lang="en-GB" sz="1100" b="0" i="0" u="none" strike="noStrike" dirty="0">
+                <a:solidFill>
+                  <a:srgbClr val="A31515"/>
+                </a:solidFill>
+                <a:effectLst/>
+                <a:latin typeface="Courier New" panose="02070309020205020404" pitchFamily="49" charset="0"/>
+              </a:rPr>
+              <a:t>'</a:t>
+            </a:r>
+            <a:r>
+              <a:rPr lang="en-GB" sz="1100" b="0" i="0" u="none" strike="noStrike" dirty="0" err="1">
+                <a:solidFill>
+                  <a:srgbClr val="A31515"/>
+                </a:solidFill>
+                <a:effectLst/>
+                <a:latin typeface="Courier New" panose="02070309020205020404" pitchFamily="49" charset="0"/>
+              </a:rPr>
+              <a:t>relu</a:t>
+            </a:r>
+            <a:r>
+              <a:rPr lang="en-GB" sz="1100" b="0" i="0" u="none" strike="noStrike" dirty="0">
+                <a:solidFill>
+                  <a:srgbClr val="A31515"/>
+                </a:solidFill>
+                <a:effectLst/>
+                <a:latin typeface="Courier New" panose="02070309020205020404" pitchFamily="49" charset="0"/>
+              </a:rPr>
+              <a:t>'</a:t>
+            </a:r>
+            <a:r>
+              <a:rPr lang="en-GB" sz="1100" b="0" i="0" u="none" strike="noStrike" dirty="0">
+                <a:solidFill>
+                  <a:srgbClr val="000000"/>
+                </a:solidFill>
+                <a:effectLst/>
+                <a:latin typeface="Courier New" panose="02070309020205020404" pitchFamily="49" charset="0"/>
+              </a:rPr>
+              <a:t>, padding=</a:t>
+            </a:r>
+            <a:r>
+              <a:rPr lang="en-GB" sz="1100" b="0" i="0" u="none" strike="noStrike" dirty="0">
+                <a:solidFill>
+                  <a:srgbClr val="A31515"/>
+                </a:solidFill>
+                <a:effectLst/>
+                <a:latin typeface="Courier New" panose="02070309020205020404" pitchFamily="49" charset="0"/>
+              </a:rPr>
+              <a:t>'same'</a:t>
+            </a:r>
+            <a:r>
+              <a:rPr lang="en-GB" sz="1100" b="0" i="0" u="none" strike="noStrike" dirty="0">
+                <a:solidFill>
+                  <a:srgbClr val="000000"/>
+                </a:solidFill>
+                <a:effectLst/>
+                <a:latin typeface="Courier New" panose="02070309020205020404" pitchFamily="49" charset="0"/>
+              </a:rPr>
+              <a:t>)(x)</a:t>
+            </a:r>
+          </a:p>
+          <a:p>
+            <a:r>
+              <a:rPr lang="en-GB" sz="1100" b="0" i="0" u="none" strike="noStrike" dirty="0">
+                <a:solidFill>
+                  <a:srgbClr val="000000"/>
+                </a:solidFill>
+                <a:effectLst/>
+                <a:latin typeface="Courier New" panose="02070309020205020404" pitchFamily="49" charset="0"/>
+              </a:rPr>
+              <a:t>x = UpSampling2D((</a:t>
+            </a:r>
+            <a:r>
+              <a:rPr lang="en-GB" sz="1100" b="0" i="0" u="none" strike="noStrike" dirty="0">
+                <a:solidFill>
+                  <a:srgbClr val="09885A"/>
+                </a:solidFill>
+                <a:effectLst/>
+                <a:latin typeface="Courier New" panose="02070309020205020404" pitchFamily="49" charset="0"/>
+              </a:rPr>
+              <a:t>2</a:t>
+            </a:r>
+            <a:r>
+              <a:rPr lang="en-GB" sz="1100" b="0" i="0" u="none" strike="noStrike" dirty="0">
+                <a:solidFill>
+                  <a:srgbClr val="000000"/>
+                </a:solidFill>
+                <a:effectLst/>
+                <a:latin typeface="Courier New" panose="02070309020205020404" pitchFamily="49" charset="0"/>
+              </a:rPr>
+              <a:t>, </a:t>
+            </a:r>
+            <a:r>
+              <a:rPr lang="en-GB" sz="1100" b="0" i="0" u="none" strike="noStrike" dirty="0">
+                <a:solidFill>
+                  <a:srgbClr val="09885A"/>
+                </a:solidFill>
+                <a:effectLst/>
+                <a:latin typeface="Courier New" panose="02070309020205020404" pitchFamily="49" charset="0"/>
+              </a:rPr>
+              <a:t>2</a:t>
+            </a:r>
+            <a:r>
+              <a:rPr lang="en-GB" sz="1100" b="0" i="0" u="none" strike="noStrike" dirty="0">
+                <a:solidFill>
+                  <a:srgbClr val="000000"/>
+                </a:solidFill>
+                <a:effectLst/>
+                <a:latin typeface="Courier New" panose="02070309020205020404" pitchFamily="49" charset="0"/>
+              </a:rPr>
+              <a:t>))(x)</a:t>
+            </a:r>
+          </a:p>
+          <a:p>
+            <a:r>
+              <a:rPr lang="en-GB" sz="1100" b="0" i="0" u="none" strike="noStrike" dirty="0">
+                <a:solidFill>
+                  <a:srgbClr val="000000"/>
+                </a:solidFill>
+                <a:effectLst/>
+                <a:latin typeface="Courier New" panose="02070309020205020404" pitchFamily="49" charset="0"/>
+              </a:rPr>
+              <a:t>x =  Conv2D(</a:t>
+            </a:r>
+            <a:r>
+              <a:rPr lang="en-GB" sz="1100" b="0" i="0" u="none" strike="noStrike" dirty="0">
+                <a:solidFill>
+                  <a:srgbClr val="09885A"/>
+                </a:solidFill>
+                <a:effectLst/>
+                <a:latin typeface="Courier New" panose="02070309020205020404" pitchFamily="49" charset="0"/>
+              </a:rPr>
+              <a:t>32</a:t>
+            </a:r>
+            <a:r>
+              <a:rPr lang="en-GB" sz="1100" b="0" i="0" u="none" strike="noStrike" dirty="0">
+                <a:solidFill>
+                  <a:srgbClr val="000000"/>
+                </a:solidFill>
+                <a:effectLst/>
+                <a:latin typeface="Courier New" panose="02070309020205020404" pitchFamily="49" charset="0"/>
+              </a:rPr>
+              <a:t>, (</a:t>
+            </a:r>
+            <a:r>
+              <a:rPr lang="en-GB" sz="1100" b="0" i="0" u="none" strike="noStrike" dirty="0">
+                <a:solidFill>
+                  <a:srgbClr val="09885A"/>
+                </a:solidFill>
+                <a:effectLst/>
+                <a:latin typeface="Courier New" panose="02070309020205020404" pitchFamily="49" charset="0"/>
+              </a:rPr>
+              <a:t>3</a:t>
+            </a:r>
+            <a:r>
+              <a:rPr lang="en-GB" sz="1100" b="0" i="0" u="none" strike="noStrike" dirty="0">
+                <a:solidFill>
+                  <a:srgbClr val="000000"/>
+                </a:solidFill>
+                <a:effectLst/>
+                <a:latin typeface="Courier New" panose="02070309020205020404" pitchFamily="49" charset="0"/>
+              </a:rPr>
+              <a:t>, </a:t>
+            </a:r>
+            <a:r>
+              <a:rPr lang="en-GB" sz="1100" b="0" i="0" u="none" strike="noStrike" dirty="0">
+                <a:solidFill>
+                  <a:srgbClr val="09885A"/>
+                </a:solidFill>
+                <a:effectLst/>
+                <a:latin typeface="Courier New" panose="02070309020205020404" pitchFamily="49" charset="0"/>
+              </a:rPr>
+              <a:t>3</a:t>
+            </a:r>
+            <a:r>
+              <a:rPr lang="en-GB" sz="1100" b="0" i="0" u="none" strike="noStrike" dirty="0">
+                <a:solidFill>
+                  <a:srgbClr val="000000"/>
+                </a:solidFill>
+                <a:effectLst/>
+                <a:latin typeface="Courier New" panose="02070309020205020404" pitchFamily="49" charset="0"/>
+              </a:rPr>
+              <a:t>), activation=</a:t>
+            </a:r>
+            <a:r>
+              <a:rPr lang="en-GB" sz="1100" b="0" i="0" u="none" strike="noStrike" dirty="0">
+                <a:solidFill>
+                  <a:srgbClr val="A31515"/>
+                </a:solidFill>
+                <a:effectLst/>
+                <a:latin typeface="Courier New" panose="02070309020205020404" pitchFamily="49" charset="0"/>
+              </a:rPr>
+              <a:t>'</a:t>
+            </a:r>
+            <a:r>
+              <a:rPr lang="en-GB" sz="1100" b="0" i="0" u="none" strike="noStrike" dirty="0" err="1">
+                <a:solidFill>
+                  <a:srgbClr val="A31515"/>
+                </a:solidFill>
+                <a:effectLst/>
+                <a:latin typeface="Courier New" panose="02070309020205020404" pitchFamily="49" charset="0"/>
+              </a:rPr>
+              <a:t>relu</a:t>
+            </a:r>
+            <a:r>
+              <a:rPr lang="en-GB" sz="1100" b="0" i="0" u="none" strike="noStrike" dirty="0">
+                <a:solidFill>
+                  <a:srgbClr val="A31515"/>
+                </a:solidFill>
+                <a:effectLst/>
+                <a:latin typeface="Courier New" panose="02070309020205020404" pitchFamily="49" charset="0"/>
+              </a:rPr>
+              <a:t>'</a:t>
+            </a:r>
+            <a:r>
+              <a:rPr lang="en-GB" sz="1100" b="0" i="0" u="none" strike="noStrike" dirty="0">
+                <a:solidFill>
+                  <a:srgbClr val="000000"/>
+                </a:solidFill>
+                <a:effectLst/>
+                <a:latin typeface="Courier New" panose="02070309020205020404" pitchFamily="49" charset="0"/>
+              </a:rPr>
+              <a:t>, padding=</a:t>
+            </a:r>
+            <a:r>
+              <a:rPr lang="en-GB" sz="1100" b="0" i="0" u="none" strike="noStrike" dirty="0">
+                <a:solidFill>
+                  <a:srgbClr val="A31515"/>
+                </a:solidFill>
+                <a:effectLst/>
+                <a:latin typeface="Courier New" panose="02070309020205020404" pitchFamily="49" charset="0"/>
+              </a:rPr>
+              <a:t>'same'</a:t>
+            </a:r>
+            <a:r>
+              <a:rPr lang="en-GB" sz="1100" b="0" i="0" u="none" strike="noStrike" dirty="0">
+                <a:solidFill>
+                  <a:srgbClr val="000000"/>
+                </a:solidFill>
+                <a:effectLst/>
+                <a:latin typeface="Courier New" panose="02070309020205020404" pitchFamily="49" charset="0"/>
+              </a:rPr>
+              <a:t>)(x)</a:t>
+            </a:r>
+          </a:p>
+          <a:p>
+            <a:r>
+              <a:rPr lang="en-GB" sz="1100" b="0" i="0" u="none" strike="noStrike" dirty="0">
+                <a:solidFill>
+                  <a:srgbClr val="000000"/>
+                </a:solidFill>
+                <a:effectLst/>
+                <a:latin typeface="Courier New" panose="02070309020205020404" pitchFamily="49" charset="0"/>
+              </a:rPr>
+              <a:t>x = UpSampling2D((</a:t>
+            </a:r>
+            <a:r>
+              <a:rPr lang="en-GB" sz="1100" b="0" i="0" u="none" strike="noStrike" dirty="0">
+                <a:solidFill>
+                  <a:srgbClr val="09885A"/>
+                </a:solidFill>
+                <a:effectLst/>
+                <a:latin typeface="Courier New" panose="02070309020205020404" pitchFamily="49" charset="0"/>
+              </a:rPr>
+              <a:t>2</a:t>
+            </a:r>
+            <a:r>
+              <a:rPr lang="en-GB" sz="1100" b="0" i="0" u="none" strike="noStrike" dirty="0">
+                <a:solidFill>
+                  <a:srgbClr val="000000"/>
+                </a:solidFill>
+                <a:effectLst/>
+                <a:latin typeface="Courier New" panose="02070309020205020404" pitchFamily="49" charset="0"/>
+              </a:rPr>
+              <a:t>, </a:t>
+            </a:r>
+            <a:r>
+              <a:rPr lang="en-GB" sz="1100" b="0" i="0" u="none" strike="noStrike" dirty="0">
+                <a:solidFill>
+                  <a:srgbClr val="09885A"/>
+                </a:solidFill>
+                <a:effectLst/>
+                <a:latin typeface="Courier New" panose="02070309020205020404" pitchFamily="49" charset="0"/>
+              </a:rPr>
+              <a:t>2</a:t>
+            </a:r>
+            <a:r>
+              <a:rPr lang="en-GB" sz="1100" b="0" i="0" u="none" strike="noStrike" dirty="0">
+                <a:solidFill>
+                  <a:srgbClr val="000000"/>
+                </a:solidFill>
+                <a:effectLst/>
+                <a:latin typeface="Courier New" panose="02070309020205020404" pitchFamily="49" charset="0"/>
+              </a:rPr>
+              <a:t>))(x)</a:t>
+            </a:r>
+          </a:p>
+          <a:p>
+            <a:r>
+              <a:rPr lang="en-GB" sz="1100" b="0" i="0" u="none" strike="noStrike" dirty="0">
+                <a:solidFill>
+                  <a:srgbClr val="000000"/>
+                </a:solidFill>
+                <a:effectLst/>
+                <a:latin typeface="Courier New" panose="02070309020205020404" pitchFamily="49" charset="0"/>
+              </a:rPr>
+              <a:t>decoded = Conv2D(</a:t>
+            </a:r>
+            <a:r>
+              <a:rPr lang="en-GB" sz="1100" b="0" i="0" u="none" strike="noStrike" dirty="0">
+                <a:solidFill>
+                  <a:srgbClr val="09885A"/>
+                </a:solidFill>
+                <a:effectLst/>
+                <a:latin typeface="Courier New" panose="02070309020205020404" pitchFamily="49" charset="0"/>
+              </a:rPr>
+              <a:t>1</a:t>
+            </a:r>
+            <a:r>
+              <a:rPr lang="en-GB" sz="1100" b="0" i="0" u="none" strike="noStrike" dirty="0">
+                <a:solidFill>
+                  <a:srgbClr val="000000"/>
+                </a:solidFill>
+                <a:effectLst/>
+                <a:latin typeface="Courier New" panose="02070309020205020404" pitchFamily="49" charset="0"/>
+              </a:rPr>
+              <a:t>, (</a:t>
+            </a:r>
+            <a:r>
+              <a:rPr lang="en-GB" sz="1100" b="0" i="0" u="none" strike="noStrike" dirty="0">
+                <a:solidFill>
+                  <a:srgbClr val="09885A"/>
+                </a:solidFill>
+                <a:effectLst/>
+                <a:latin typeface="Courier New" panose="02070309020205020404" pitchFamily="49" charset="0"/>
+              </a:rPr>
+              <a:t>3</a:t>
+            </a:r>
+            <a:r>
+              <a:rPr lang="en-GB" sz="1100" b="0" i="0" u="none" strike="noStrike" dirty="0">
+                <a:solidFill>
+                  <a:srgbClr val="000000"/>
+                </a:solidFill>
+                <a:effectLst/>
+                <a:latin typeface="Courier New" panose="02070309020205020404" pitchFamily="49" charset="0"/>
+              </a:rPr>
+              <a:t>, </a:t>
+            </a:r>
+            <a:r>
+              <a:rPr lang="en-GB" sz="1100" b="0" i="0" u="none" strike="noStrike" dirty="0">
+                <a:solidFill>
+                  <a:srgbClr val="09885A"/>
+                </a:solidFill>
+                <a:effectLst/>
+                <a:latin typeface="Courier New" panose="02070309020205020404" pitchFamily="49" charset="0"/>
+              </a:rPr>
+              <a:t>3</a:t>
+            </a:r>
+            <a:r>
+              <a:rPr lang="en-GB" sz="1100" b="0" i="0" u="none" strike="noStrike" dirty="0">
+                <a:solidFill>
+                  <a:srgbClr val="000000"/>
+                </a:solidFill>
+                <a:effectLst/>
+                <a:latin typeface="Courier New" panose="02070309020205020404" pitchFamily="49" charset="0"/>
+              </a:rPr>
+              <a:t>), padding=</a:t>
+            </a:r>
+            <a:r>
+              <a:rPr lang="en-GB" sz="1100" b="0" i="0" u="none" strike="noStrike" dirty="0">
+                <a:solidFill>
+                  <a:srgbClr val="A31515"/>
+                </a:solidFill>
+                <a:effectLst/>
+                <a:latin typeface="Courier New" panose="02070309020205020404" pitchFamily="49" charset="0"/>
+              </a:rPr>
+              <a:t>'same'</a:t>
+            </a:r>
+            <a:r>
+              <a:rPr lang="en-GB" sz="1100" b="0" i="0" u="none" strike="noStrike" dirty="0">
+                <a:solidFill>
+                  <a:srgbClr val="000000"/>
+                </a:solidFill>
+                <a:effectLst/>
+                <a:latin typeface="Courier New" panose="02070309020205020404" pitchFamily="49" charset="0"/>
+              </a:rPr>
+              <a:t>)(x)</a:t>
+            </a:r>
           </a:p>
         </p:txBody>
       </p:sp>
     </p:spTree>
     <p:extLst>
       <p:ext uri="{BB962C8B-B14F-4D97-AF65-F5344CB8AC3E}">
-        <p14:creationId xmlns:p14="http://schemas.microsoft.com/office/powerpoint/2010/main" val="1476830990"/>
+        <p14:creationId xmlns:p14="http://schemas.microsoft.com/office/powerpoint/2010/main" val="2405811328"/>
       </p:ext>
     </p:extLst>
   </p:cSld>

</xml_diff>